<commit_message>
added skript, small changes on presentation
</commit_message>
<xml_diff>
--- a/2. Lehrjahr/PuG/Religiöser Extremismus/Präsentation.pptx
+++ b/2. Lehrjahr/PuG/Religiöser Extremismus/Präsentation.pptx
@@ -4,17 +4,22 @@
   <p:sldMasterIdLst>
     <p:sldMasterId id="2147483660" r:id="rId1"/>
   </p:sldMasterIdLst>
+  <p:notesMasterIdLst>
+    <p:notesMasterId r:id="rId14"/>
+  </p:notesMasterIdLst>
   <p:sldIdLst>
     <p:sldId id="256" r:id="rId2"/>
     <p:sldId id="257" r:id="rId3"/>
-    <p:sldId id="258" r:id="rId4"/>
-    <p:sldId id="263" r:id="rId5"/>
-    <p:sldId id="259" r:id="rId6"/>
-    <p:sldId id="261" r:id="rId7"/>
-    <p:sldId id="264" r:id="rId8"/>
-    <p:sldId id="265" r:id="rId9"/>
-    <p:sldId id="266" r:id="rId10"/>
-    <p:sldId id="260" r:id="rId11"/>
+    <p:sldId id="267" r:id="rId4"/>
+    <p:sldId id="258" r:id="rId5"/>
+    <p:sldId id="263" r:id="rId6"/>
+    <p:sldId id="259" r:id="rId7"/>
+    <p:sldId id="261" r:id="rId8"/>
+    <p:sldId id="264" r:id="rId9"/>
+    <p:sldId id="265" r:id="rId10"/>
+    <p:sldId id="266" r:id="rId11"/>
+    <p:sldId id="260" r:id="rId12"/>
+    <p:sldId id="268" r:id="rId13"/>
   </p:sldIdLst>
   <p:sldSz cx="12192000" cy="6858000"/>
   <p:notesSz cx="6858000" cy="9144000"/>
@@ -129,6 +134,1298 @@
 </p1510:revInfo>
 </file>
 
+<file path=ppt/notesMasters/notesMaster1.xml><?xml version="1.0" encoding="utf-8"?>
+<p:notesMaster xmlns:a="http://schemas.openxmlformats.org/drawingml/2006/main" xmlns:r="http://schemas.openxmlformats.org/officeDocument/2006/relationships" xmlns:p="http://schemas.openxmlformats.org/presentationml/2006/main">
+  <p:cSld>
+    <p:bg>
+      <p:bgRef idx="1001">
+        <a:schemeClr val="bg1"/>
+      </p:bgRef>
+    </p:bg>
+    <p:spTree>
+      <p:nvGrpSpPr>
+        <p:cNvPr id="1" name=""/>
+        <p:cNvGrpSpPr/>
+        <p:nvPr/>
+      </p:nvGrpSpPr>
+      <p:grpSpPr>
+        <a:xfrm>
+          <a:off x="0" y="0"/>
+          <a:ext cx="0" cy="0"/>
+          <a:chOff x="0" y="0"/>
+          <a:chExt cx="0" cy="0"/>
+        </a:xfrm>
+      </p:grpSpPr>
+      <p:sp>
+        <p:nvSpPr>
+          <p:cNvPr id="2" name="Kopfzeilenplatzhalter 1"/>
+          <p:cNvSpPr>
+            <a:spLocks noGrp="1"/>
+          </p:cNvSpPr>
+          <p:nvPr>
+            <p:ph type="hdr" sz="quarter"/>
+          </p:nvPr>
+        </p:nvSpPr>
+        <p:spPr>
+          <a:xfrm>
+            <a:off x="0" y="0"/>
+            <a:ext cx="2971800" cy="458788"/>
+          </a:xfrm>
+          <a:prstGeom prst="rect">
+            <a:avLst/>
+          </a:prstGeom>
+        </p:spPr>
+        <p:txBody>
+          <a:bodyPr vert="horz" lIns="91440" tIns="45720" rIns="91440" bIns="45720" rtlCol="0"/>
+          <a:lstStyle>
+            <a:lvl1pPr algn="l">
+              <a:defRPr sz="1200"/>
+            </a:lvl1pPr>
+          </a:lstStyle>
+          <a:p>
+            <a:endParaRPr lang="de-DE"/>
+          </a:p>
+        </p:txBody>
+      </p:sp>
+      <p:sp>
+        <p:nvSpPr>
+          <p:cNvPr id="3" name="Datumsplatzhalter 2"/>
+          <p:cNvSpPr>
+            <a:spLocks noGrp="1"/>
+          </p:cNvSpPr>
+          <p:nvPr>
+            <p:ph type="dt" idx="1"/>
+          </p:nvPr>
+        </p:nvSpPr>
+        <p:spPr>
+          <a:xfrm>
+            <a:off x="3884613" y="0"/>
+            <a:ext cx="2971800" cy="458788"/>
+          </a:xfrm>
+          <a:prstGeom prst="rect">
+            <a:avLst/>
+          </a:prstGeom>
+        </p:spPr>
+        <p:txBody>
+          <a:bodyPr vert="horz" lIns="91440" tIns="45720" rIns="91440" bIns="45720" rtlCol="0"/>
+          <a:lstStyle>
+            <a:lvl1pPr algn="r">
+              <a:defRPr sz="1200"/>
+            </a:lvl1pPr>
+          </a:lstStyle>
+          <a:p>
+            <a:fld id="{03BB8421-078D-45BA-ABE8-B9C0956D43E1}" type="datetimeFigureOut">
+              <a:rPr lang="de-DE" smtClean="0"/>
+              <a:t>26.06.2022</a:t>
+            </a:fld>
+            <a:endParaRPr lang="de-DE"/>
+          </a:p>
+        </p:txBody>
+      </p:sp>
+      <p:sp>
+        <p:nvSpPr>
+          <p:cNvPr id="4" name="Folienbildplatzhalter 3"/>
+          <p:cNvSpPr>
+            <a:spLocks noGrp="1" noRot="1" noChangeAspect="1"/>
+          </p:cNvSpPr>
+          <p:nvPr>
+            <p:ph type="sldImg" idx="2"/>
+          </p:nvPr>
+        </p:nvSpPr>
+        <p:spPr>
+          <a:xfrm>
+            <a:off x="685800" y="1143000"/>
+            <a:ext cx="5486400" cy="3086100"/>
+          </a:xfrm>
+          <a:prstGeom prst="rect">
+            <a:avLst/>
+          </a:prstGeom>
+          <a:noFill/>
+          <a:ln w="12700">
+            <a:solidFill>
+              <a:prstClr val="black"/>
+            </a:solidFill>
+          </a:ln>
+        </p:spPr>
+        <p:txBody>
+          <a:bodyPr vert="horz" lIns="91440" tIns="45720" rIns="91440" bIns="45720" rtlCol="0" anchor="ctr"/>
+          <a:lstStyle/>
+          <a:p>
+            <a:endParaRPr lang="de-DE"/>
+          </a:p>
+        </p:txBody>
+      </p:sp>
+      <p:sp>
+        <p:nvSpPr>
+          <p:cNvPr id="5" name="Notizenplatzhalter 4"/>
+          <p:cNvSpPr>
+            <a:spLocks noGrp="1"/>
+          </p:cNvSpPr>
+          <p:nvPr>
+            <p:ph type="body" sz="quarter" idx="3"/>
+          </p:nvPr>
+        </p:nvSpPr>
+        <p:spPr>
+          <a:xfrm>
+            <a:off x="685800" y="4400550"/>
+            <a:ext cx="5486400" cy="3600450"/>
+          </a:xfrm>
+          <a:prstGeom prst="rect">
+            <a:avLst/>
+          </a:prstGeom>
+        </p:spPr>
+        <p:txBody>
+          <a:bodyPr vert="horz" lIns="91440" tIns="45720" rIns="91440" bIns="45720" rtlCol="0"/>
+          <a:lstStyle/>
+          <a:p>
+            <a:pPr lvl="0"/>
+            <a:r>
+              <a:rPr lang="de-DE"/>
+              <a:t>Mastertextformat bearbeiten</a:t>
+            </a:r>
+          </a:p>
+          <a:p>
+            <a:pPr lvl="1"/>
+            <a:r>
+              <a:rPr lang="de-DE"/>
+              <a:t>Zweite Ebene</a:t>
+            </a:r>
+          </a:p>
+          <a:p>
+            <a:pPr lvl="2"/>
+            <a:r>
+              <a:rPr lang="de-DE"/>
+              <a:t>Dritte Ebene</a:t>
+            </a:r>
+          </a:p>
+          <a:p>
+            <a:pPr lvl="3"/>
+            <a:r>
+              <a:rPr lang="de-DE"/>
+              <a:t>Vierte Ebene</a:t>
+            </a:r>
+          </a:p>
+          <a:p>
+            <a:pPr lvl="4"/>
+            <a:r>
+              <a:rPr lang="de-DE"/>
+              <a:t>Fünfte Ebene</a:t>
+            </a:r>
+          </a:p>
+        </p:txBody>
+      </p:sp>
+      <p:sp>
+        <p:nvSpPr>
+          <p:cNvPr id="6" name="Fußzeilenplatzhalter 5"/>
+          <p:cNvSpPr>
+            <a:spLocks noGrp="1"/>
+          </p:cNvSpPr>
+          <p:nvPr>
+            <p:ph type="ftr" sz="quarter" idx="4"/>
+          </p:nvPr>
+        </p:nvSpPr>
+        <p:spPr>
+          <a:xfrm>
+            <a:off x="0" y="8685213"/>
+            <a:ext cx="2971800" cy="458787"/>
+          </a:xfrm>
+          <a:prstGeom prst="rect">
+            <a:avLst/>
+          </a:prstGeom>
+        </p:spPr>
+        <p:txBody>
+          <a:bodyPr vert="horz" lIns="91440" tIns="45720" rIns="91440" bIns="45720" rtlCol="0" anchor="b"/>
+          <a:lstStyle>
+            <a:lvl1pPr algn="l">
+              <a:defRPr sz="1200"/>
+            </a:lvl1pPr>
+          </a:lstStyle>
+          <a:p>
+            <a:endParaRPr lang="de-DE"/>
+          </a:p>
+        </p:txBody>
+      </p:sp>
+      <p:sp>
+        <p:nvSpPr>
+          <p:cNvPr id="7" name="Foliennummernplatzhalter 6"/>
+          <p:cNvSpPr>
+            <a:spLocks noGrp="1"/>
+          </p:cNvSpPr>
+          <p:nvPr>
+            <p:ph type="sldNum" sz="quarter" idx="5"/>
+          </p:nvPr>
+        </p:nvSpPr>
+        <p:spPr>
+          <a:xfrm>
+            <a:off x="3884613" y="8685213"/>
+            <a:ext cx="2971800" cy="458787"/>
+          </a:xfrm>
+          <a:prstGeom prst="rect">
+            <a:avLst/>
+          </a:prstGeom>
+        </p:spPr>
+        <p:txBody>
+          <a:bodyPr vert="horz" lIns="91440" tIns="45720" rIns="91440" bIns="45720" rtlCol="0" anchor="b"/>
+          <a:lstStyle>
+            <a:lvl1pPr algn="r">
+              <a:defRPr sz="1200"/>
+            </a:lvl1pPr>
+          </a:lstStyle>
+          <a:p>
+            <a:fld id="{4233C98D-1887-4C32-815E-C2076787E276}" type="slidenum">
+              <a:rPr lang="de-DE" smtClean="0"/>
+              <a:t>‹Nr.›</a:t>
+            </a:fld>
+            <a:endParaRPr lang="de-DE"/>
+          </a:p>
+        </p:txBody>
+      </p:sp>
+    </p:spTree>
+    <p:extLst>
+      <p:ext uri="{BB962C8B-B14F-4D97-AF65-F5344CB8AC3E}">
+        <p14:creationId xmlns:p14="http://schemas.microsoft.com/office/powerpoint/2010/main" val="3792353465"/>
+      </p:ext>
+    </p:extLst>
+  </p:cSld>
+  <p:clrMap bg1="lt1" tx1="dk1" bg2="lt2" tx2="dk2" accent1="accent1" accent2="accent2" accent3="accent3" accent4="accent4" accent5="accent5" accent6="accent6" hlink="hlink" folHlink="folHlink"/>
+  <p:notesStyle>
+    <a:lvl1pPr marL="0" algn="l" defTabSz="914400" rtl="0" eaLnBrk="1" latinLnBrk="0" hangingPunct="1">
+      <a:defRPr sz="1200" kern="1200">
+        <a:solidFill>
+          <a:schemeClr val="tx1"/>
+        </a:solidFill>
+        <a:latin typeface="+mn-lt"/>
+        <a:ea typeface="+mn-ea"/>
+        <a:cs typeface="+mn-cs"/>
+      </a:defRPr>
+    </a:lvl1pPr>
+    <a:lvl2pPr marL="457200" algn="l" defTabSz="914400" rtl="0" eaLnBrk="1" latinLnBrk="0" hangingPunct="1">
+      <a:defRPr sz="1200" kern="1200">
+        <a:solidFill>
+          <a:schemeClr val="tx1"/>
+        </a:solidFill>
+        <a:latin typeface="+mn-lt"/>
+        <a:ea typeface="+mn-ea"/>
+        <a:cs typeface="+mn-cs"/>
+      </a:defRPr>
+    </a:lvl2pPr>
+    <a:lvl3pPr marL="914400" algn="l" defTabSz="914400" rtl="0" eaLnBrk="1" latinLnBrk="0" hangingPunct="1">
+      <a:defRPr sz="1200" kern="1200">
+        <a:solidFill>
+          <a:schemeClr val="tx1"/>
+        </a:solidFill>
+        <a:latin typeface="+mn-lt"/>
+        <a:ea typeface="+mn-ea"/>
+        <a:cs typeface="+mn-cs"/>
+      </a:defRPr>
+    </a:lvl3pPr>
+    <a:lvl4pPr marL="1371600" algn="l" defTabSz="914400" rtl="0" eaLnBrk="1" latinLnBrk="0" hangingPunct="1">
+      <a:defRPr sz="1200" kern="1200">
+        <a:solidFill>
+          <a:schemeClr val="tx1"/>
+        </a:solidFill>
+        <a:latin typeface="+mn-lt"/>
+        <a:ea typeface="+mn-ea"/>
+        <a:cs typeface="+mn-cs"/>
+      </a:defRPr>
+    </a:lvl4pPr>
+    <a:lvl5pPr marL="1828800" algn="l" defTabSz="914400" rtl="0" eaLnBrk="1" latinLnBrk="0" hangingPunct="1">
+      <a:defRPr sz="1200" kern="1200">
+        <a:solidFill>
+          <a:schemeClr val="tx1"/>
+        </a:solidFill>
+        <a:latin typeface="+mn-lt"/>
+        <a:ea typeface="+mn-ea"/>
+        <a:cs typeface="+mn-cs"/>
+      </a:defRPr>
+    </a:lvl5pPr>
+    <a:lvl6pPr marL="2286000" algn="l" defTabSz="914400" rtl="0" eaLnBrk="1" latinLnBrk="0" hangingPunct="1">
+      <a:defRPr sz="1200" kern="1200">
+        <a:solidFill>
+          <a:schemeClr val="tx1"/>
+        </a:solidFill>
+        <a:latin typeface="+mn-lt"/>
+        <a:ea typeface="+mn-ea"/>
+        <a:cs typeface="+mn-cs"/>
+      </a:defRPr>
+    </a:lvl6pPr>
+    <a:lvl7pPr marL="2743200" algn="l" defTabSz="914400" rtl="0" eaLnBrk="1" latinLnBrk="0" hangingPunct="1">
+      <a:defRPr sz="1200" kern="1200">
+        <a:solidFill>
+          <a:schemeClr val="tx1"/>
+        </a:solidFill>
+        <a:latin typeface="+mn-lt"/>
+        <a:ea typeface="+mn-ea"/>
+        <a:cs typeface="+mn-cs"/>
+      </a:defRPr>
+    </a:lvl7pPr>
+    <a:lvl8pPr marL="3200400" algn="l" defTabSz="914400" rtl="0" eaLnBrk="1" latinLnBrk="0" hangingPunct="1">
+      <a:defRPr sz="1200" kern="1200">
+        <a:solidFill>
+          <a:schemeClr val="tx1"/>
+        </a:solidFill>
+        <a:latin typeface="+mn-lt"/>
+        <a:ea typeface="+mn-ea"/>
+        <a:cs typeface="+mn-cs"/>
+      </a:defRPr>
+    </a:lvl8pPr>
+    <a:lvl9pPr marL="3657600" algn="l" defTabSz="914400" rtl="0" eaLnBrk="1" latinLnBrk="0" hangingPunct="1">
+      <a:defRPr sz="1200" kern="1200">
+        <a:solidFill>
+          <a:schemeClr val="tx1"/>
+        </a:solidFill>
+        <a:latin typeface="+mn-lt"/>
+        <a:ea typeface="+mn-ea"/>
+        <a:cs typeface="+mn-cs"/>
+      </a:defRPr>
+    </a:lvl9pPr>
+  </p:notesStyle>
+</p:notesMaster>
+</file>
+
+<file path=ppt/notesSlides/notesSlide1.xml><?xml version="1.0" encoding="utf-8"?>
+<p:notes xmlns:a="http://schemas.openxmlformats.org/drawingml/2006/main" xmlns:r="http://schemas.openxmlformats.org/officeDocument/2006/relationships" xmlns:p="http://schemas.openxmlformats.org/presentationml/2006/main">
+  <p:cSld>
+    <p:spTree>
+      <p:nvGrpSpPr>
+        <p:cNvPr id="1" name=""/>
+        <p:cNvGrpSpPr/>
+        <p:nvPr/>
+      </p:nvGrpSpPr>
+      <p:grpSpPr>
+        <a:xfrm>
+          <a:off x="0" y="0"/>
+          <a:ext cx="0" cy="0"/>
+          <a:chOff x="0" y="0"/>
+          <a:chExt cx="0" cy="0"/>
+        </a:xfrm>
+      </p:grpSpPr>
+      <p:sp>
+        <p:nvSpPr>
+          <p:cNvPr id="2" name="Folienbildplatzhalter 1"/>
+          <p:cNvSpPr>
+            <a:spLocks noGrp="1" noRot="1" noChangeAspect="1"/>
+          </p:cNvSpPr>
+          <p:nvPr>
+            <p:ph type="sldImg"/>
+          </p:nvPr>
+        </p:nvSpPr>
+        <p:spPr/>
+      </p:sp>
+      <p:sp>
+        <p:nvSpPr>
+          <p:cNvPr id="3" name="Notizenplatzhalter 2"/>
+          <p:cNvSpPr>
+            <a:spLocks noGrp="1"/>
+          </p:cNvSpPr>
+          <p:nvPr>
+            <p:ph type="body" idx="1"/>
+          </p:nvPr>
+        </p:nvSpPr>
+        <p:spPr/>
+        <p:txBody>
+          <a:bodyPr/>
+          <a:lstStyle/>
+          <a:p>
+            <a:r>
+              <a:rPr lang="de-DE" dirty="0"/>
+              <a:t>In den letzten Jahren ist religiöser Extremismus in vielen Teilen der Welt zu einem wachsenden Problem geworden. Während es eine Reihe von Faktoren gibt, die zu diesem Problem beitragen, ist einer der wichtigsten die wachsende Zahl von Menschen, die sich mit einer bestimmten Religion identifizieren. Dies liegt oft daran, dass die Menschen immer religiöser werden, wenn sie nach Sinn und Zweck in ihrem Leben suchen.</a:t>
+            </a:r>
+          </a:p>
+        </p:txBody>
+      </p:sp>
+      <p:sp>
+        <p:nvSpPr>
+          <p:cNvPr id="4" name="Foliennummernplatzhalter 3"/>
+          <p:cNvSpPr>
+            <a:spLocks noGrp="1"/>
+          </p:cNvSpPr>
+          <p:nvPr>
+            <p:ph type="sldNum" sz="quarter" idx="5"/>
+          </p:nvPr>
+        </p:nvSpPr>
+        <p:spPr/>
+        <p:txBody>
+          <a:bodyPr/>
+          <a:lstStyle/>
+          <a:p>
+            <a:fld id="{4233C98D-1887-4C32-815E-C2076787E276}" type="slidenum">
+              <a:rPr lang="de-DE" smtClean="0"/>
+              <a:t>1</a:t>
+            </a:fld>
+            <a:endParaRPr lang="de-DE"/>
+          </a:p>
+        </p:txBody>
+      </p:sp>
+    </p:spTree>
+    <p:extLst>
+      <p:ext uri="{BB962C8B-B14F-4D97-AF65-F5344CB8AC3E}">
+        <p14:creationId xmlns:p14="http://schemas.microsoft.com/office/powerpoint/2010/main" val="2630491427"/>
+      </p:ext>
+    </p:extLst>
+  </p:cSld>
+  <p:clrMapOvr>
+    <a:masterClrMapping/>
+  </p:clrMapOvr>
+</p:notes>
+</file>
+
+<file path=ppt/notesSlides/notesSlide10.xml><?xml version="1.0" encoding="utf-8"?>
+<p:notes xmlns:a="http://schemas.openxmlformats.org/drawingml/2006/main" xmlns:r="http://schemas.openxmlformats.org/officeDocument/2006/relationships" xmlns:p="http://schemas.openxmlformats.org/presentationml/2006/main">
+  <p:cSld>
+    <p:spTree>
+      <p:nvGrpSpPr>
+        <p:cNvPr id="1" name=""/>
+        <p:cNvGrpSpPr/>
+        <p:nvPr/>
+      </p:nvGrpSpPr>
+      <p:grpSpPr>
+        <a:xfrm>
+          <a:off x="0" y="0"/>
+          <a:ext cx="0" cy="0"/>
+          <a:chOff x="0" y="0"/>
+          <a:chExt cx="0" cy="0"/>
+        </a:xfrm>
+      </p:grpSpPr>
+      <p:sp>
+        <p:nvSpPr>
+          <p:cNvPr id="2" name="Folienbildplatzhalter 1"/>
+          <p:cNvSpPr>
+            <a:spLocks noGrp="1" noRot="1" noChangeAspect="1"/>
+          </p:cNvSpPr>
+          <p:nvPr>
+            <p:ph type="sldImg"/>
+          </p:nvPr>
+        </p:nvSpPr>
+        <p:spPr/>
+      </p:sp>
+      <p:sp>
+        <p:nvSpPr>
+          <p:cNvPr id="3" name="Notizenplatzhalter 2"/>
+          <p:cNvSpPr>
+            <a:spLocks noGrp="1"/>
+          </p:cNvSpPr>
+          <p:nvPr>
+            <p:ph type="body" idx="1"/>
+          </p:nvPr>
+        </p:nvSpPr>
+        <p:spPr/>
+        <p:txBody>
+          <a:bodyPr/>
+          <a:lstStyle/>
+          <a:p>
+            <a:r>
+              <a:rPr lang="de-DE" dirty="0"/>
+              <a:t>5. Wie kann religiöser Extremismus verhindert </a:t>
+            </a:r>
+            <a:r>
+              <a:rPr lang="de-DE" dirty="0" err="1"/>
+              <a:t>werden?Diese</a:t>
+            </a:r>
+            <a:r>
+              <a:rPr lang="de-DE" dirty="0"/>
+              <a:t> Frage zu beantworten ist schwer, es gibt aber mögliche Maßnahmen, die ergriffen werden könnten, um religiösen Extremismus zu reduzieren, wären:- Bereitstellung von Bildungsangeboten, die religiöse Toleranz und Verständnis fördern- Förderung des Dialogs und der Debatte zwischen verschiedenen religiösen Gruppen- Förderung des Säkularismus und der Trennung von Kirche und Staat- Arbeiten zur Lösung sozialer und wirtschaftlicher Missstände, die von Extremisten ausgenutzt werden können- Störung der Finanzierung und Rekrutierung von Extremisten</a:t>
+            </a:r>
+          </a:p>
+          <a:p>
+            <a:endParaRPr lang="de-DE" dirty="0"/>
+          </a:p>
+          <a:p>
+            <a:r>
+              <a:rPr lang="de-DE" dirty="0"/>
+              <a:t>Säkularismus ist im eine Weltanschauung, die auf einer Trennung von Religion und Staat beruht.</a:t>
+            </a:r>
+          </a:p>
+        </p:txBody>
+      </p:sp>
+      <p:sp>
+        <p:nvSpPr>
+          <p:cNvPr id="4" name="Foliennummernplatzhalter 3"/>
+          <p:cNvSpPr>
+            <a:spLocks noGrp="1"/>
+          </p:cNvSpPr>
+          <p:nvPr>
+            <p:ph type="sldNum" sz="quarter" idx="5"/>
+          </p:nvPr>
+        </p:nvSpPr>
+        <p:spPr/>
+        <p:txBody>
+          <a:bodyPr/>
+          <a:lstStyle/>
+          <a:p>
+            <a:fld id="{4233C98D-1887-4C32-815E-C2076787E276}" type="slidenum">
+              <a:rPr lang="de-DE" smtClean="0"/>
+              <a:t>10</a:t>
+            </a:fld>
+            <a:endParaRPr lang="de-DE"/>
+          </a:p>
+        </p:txBody>
+      </p:sp>
+    </p:spTree>
+    <p:extLst>
+      <p:ext uri="{BB962C8B-B14F-4D97-AF65-F5344CB8AC3E}">
+        <p14:creationId xmlns:p14="http://schemas.microsoft.com/office/powerpoint/2010/main" val="3036979653"/>
+      </p:ext>
+    </p:extLst>
+  </p:cSld>
+  <p:clrMapOvr>
+    <a:masterClrMapping/>
+  </p:clrMapOvr>
+</p:notes>
+</file>
+
+<file path=ppt/notesSlides/notesSlide2.xml><?xml version="1.0" encoding="utf-8"?>
+<p:notes xmlns:a="http://schemas.openxmlformats.org/drawingml/2006/main" xmlns:r="http://schemas.openxmlformats.org/officeDocument/2006/relationships" xmlns:p="http://schemas.openxmlformats.org/presentationml/2006/main">
+  <p:cSld>
+    <p:spTree>
+      <p:nvGrpSpPr>
+        <p:cNvPr id="1" name=""/>
+        <p:cNvGrpSpPr/>
+        <p:nvPr/>
+      </p:nvGrpSpPr>
+      <p:grpSpPr>
+        <a:xfrm>
+          <a:off x="0" y="0"/>
+          <a:ext cx="0" cy="0"/>
+          <a:chOff x="0" y="0"/>
+          <a:chExt cx="0" cy="0"/>
+        </a:xfrm>
+      </p:grpSpPr>
+      <p:sp>
+        <p:nvSpPr>
+          <p:cNvPr id="2" name="Folienbildplatzhalter 1"/>
+          <p:cNvSpPr>
+            <a:spLocks noGrp="1" noRot="1" noChangeAspect="1"/>
+          </p:cNvSpPr>
+          <p:nvPr>
+            <p:ph type="sldImg"/>
+          </p:nvPr>
+        </p:nvSpPr>
+        <p:spPr/>
+      </p:sp>
+      <p:sp>
+        <p:nvSpPr>
+          <p:cNvPr id="3" name="Notizenplatzhalter 2"/>
+          <p:cNvSpPr>
+            <a:spLocks noGrp="1"/>
+          </p:cNvSpPr>
+          <p:nvPr>
+            <p:ph type="body" idx="1"/>
+          </p:nvPr>
+        </p:nvSpPr>
+        <p:spPr/>
+        <p:txBody>
+          <a:bodyPr/>
+          <a:lstStyle/>
+          <a:p>
+            <a:r>
+              <a:rPr lang="de-DE" dirty="0"/>
+              <a:t>Während es wichtig ist, die Gründe für religiösen Extremismus zu verstehen, ist es auch wichtig, sich daran zu erinnern, dass die überwiegende Mehrheit der Menschen, die sich mit einer bestimmten Religion identifizieren, keine Extremisten sind. Tatsächlich praktizieren die meisten Menschen eine Religion friedlich und ohne die Absicht, anderen zu schaden. Nur eine kleine Minderheit treibt ihre Religion auf die Spitze und rechtfertigt damit Gewalt.</a:t>
+            </a:r>
+          </a:p>
+        </p:txBody>
+      </p:sp>
+      <p:sp>
+        <p:nvSpPr>
+          <p:cNvPr id="4" name="Foliennummernplatzhalter 3"/>
+          <p:cNvSpPr>
+            <a:spLocks noGrp="1"/>
+          </p:cNvSpPr>
+          <p:nvPr>
+            <p:ph type="sldNum" sz="quarter" idx="5"/>
+          </p:nvPr>
+        </p:nvSpPr>
+        <p:spPr/>
+        <p:txBody>
+          <a:bodyPr/>
+          <a:lstStyle/>
+          <a:p>
+            <a:fld id="{4233C98D-1887-4C32-815E-C2076787E276}" type="slidenum">
+              <a:rPr lang="de-DE" smtClean="0"/>
+              <a:t>2</a:t>
+            </a:fld>
+            <a:endParaRPr lang="de-DE"/>
+          </a:p>
+        </p:txBody>
+      </p:sp>
+    </p:spTree>
+    <p:extLst>
+      <p:ext uri="{BB962C8B-B14F-4D97-AF65-F5344CB8AC3E}">
+        <p14:creationId xmlns:p14="http://schemas.microsoft.com/office/powerpoint/2010/main" val="3896450579"/>
+      </p:ext>
+    </p:extLst>
+  </p:cSld>
+  <p:clrMapOvr>
+    <a:masterClrMapping/>
+  </p:clrMapOvr>
+</p:notes>
+</file>
+
+<file path=ppt/notesSlides/notesSlide3.xml><?xml version="1.0" encoding="utf-8"?>
+<p:notes xmlns:a="http://schemas.openxmlformats.org/drawingml/2006/main" xmlns:r="http://schemas.openxmlformats.org/officeDocument/2006/relationships" xmlns:p="http://schemas.openxmlformats.org/presentationml/2006/main">
+  <p:cSld>
+    <p:spTree>
+      <p:nvGrpSpPr>
+        <p:cNvPr id="1" name=""/>
+        <p:cNvGrpSpPr/>
+        <p:nvPr/>
+      </p:nvGrpSpPr>
+      <p:grpSpPr>
+        <a:xfrm>
+          <a:off x="0" y="0"/>
+          <a:ext cx="0" cy="0"/>
+          <a:chOff x="0" y="0"/>
+          <a:chExt cx="0" cy="0"/>
+        </a:xfrm>
+      </p:grpSpPr>
+      <p:sp>
+        <p:nvSpPr>
+          <p:cNvPr id="2" name="Folienbildplatzhalter 1"/>
+          <p:cNvSpPr>
+            <a:spLocks noGrp="1" noRot="1" noChangeAspect="1"/>
+          </p:cNvSpPr>
+          <p:nvPr>
+            <p:ph type="sldImg"/>
+          </p:nvPr>
+        </p:nvSpPr>
+        <p:spPr/>
+      </p:sp>
+      <p:sp>
+        <p:nvSpPr>
+          <p:cNvPr id="3" name="Notizenplatzhalter 2"/>
+          <p:cNvSpPr>
+            <a:spLocks noGrp="1"/>
+          </p:cNvSpPr>
+          <p:nvPr>
+            <p:ph type="body" idx="1"/>
+          </p:nvPr>
+        </p:nvSpPr>
+        <p:spPr/>
+        <p:txBody>
+          <a:bodyPr/>
+          <a:lstStyle/>
+          <a:p>
+            <a:r>
+              <a:rPr lang="de-DE" dirty="0"/>
+              <a:t>Religiöser Extremismus wird definiert als sehr starke religiöse Überzeugungen, die zu Gewalt oder Intoleranz gegenüber anderen führen.</a:t>
+            </a:r>
+          </a:p>
+        </p:txBody>
+      </p:sp>
+      <p:sp>
+        <p:nvSpPr>
+          <p:cNvPr id="4" name="Foliennummernplatzhalter 3"/>
+          <p:cNvSpPr>
+            <a:spLocks noGrp="1"/>
+          </p:cNvSpPr>
+          <p:nvPr>
+            <p:ph type="sldNum" sz="quarter" idx="5"/>
+          </p:nvPr>
+        </p:nvSpPr>
+        <p:spPr/>
+        <p:txBody>
+          <a:bodyPr/>
+          <a:lstStyle/>
+          <a:p>
+            <a:fld id="{4233C98D-1887-4C32-815E-C2076787E276}" type="slidenum">
+              <a:rPr lang="de-DE" smtClean="0"/>
+              <a:t>3</a:t>
+            </a:fld>
+            <a:endParaRPr lang="de-DE"/>
+          </a:p>
+        </p:txBody>
+      </p:sp>
+    </p:spTree>
+    <p:extLst>
+      <p:ext uri="{BB962C8B-B14F-4D97-AF65-F5344CB8AC3E}">
+        <p14:creationId xmlns:p14="http://schemas.microsoft.com/office/powerpoint/2010/main" val="3390060091"/>
+      </p:ext>
+    </p:extLst>
+  </p:cSld>
+  <p:clrMapOvr>
+    <a:masterClrMapping/>
+  </p:clrMapOvr>
+</p:notes>
+</file>
+
+<file path=ppt/notesSlides/notesSlide4.xml><?xml version="1.0" encoding="utf-8"?>
+<p:notes xmlns:a="http://schemas.openxmlformats.org/drawingml/2006/main" xmlns:r="http://schemas.openxmlformats.org/officeDocument/2006/relationships" xmlns:p="http://schemas.openxmlformats.org/presentationml/2006/main">
+  <p:cSld>
+    <p:spTree>
+      <p:nvGrpSpPr>
+        <p:cNvPr id="1" name=""/>
+        <p:cNvGrpSpPr/>
+        <p:nvPr/>
+      </p:nvGrpSpPr>
+      <p:grpSpPr>
+        <a:xfrm>
+          <a:off x="0" y="0"/>
+          <a:ext cx="0" cy="0"/>
+          <a:chOff x="0" y="0"/>
+          <a:chExt cx="0" cy="0"/>
+        </a:xfrm>
+      </p:grpSpPr>
+      <p:sp>
+        <p:nvSpPr>
+          <p:cNvPr id="2" name="Folienbildplatzhalter 1"/>
+          <p:cNvSpPr>
+            <a:spLocks noGrp="1" noRot="1" noChangeAspect="1"/>
+          </p:cNvSpPr>
+          <p:nvPr>
+            <p:ph type="sldImg"/>
+          </p:nvPr>
+        </p:nvSpPr>
+        <p:spPr/>
+      </p:sp>
+      <p:sp>
+        <p:nvSpPr>
+          <p:cNvPr id="3" name="Notizenplatzhalter 2"/>
+          <p:cNvSpPr>
+            <a:spLocks noGrp="1"/>
+          </p:cNvSpPr>
+          <p:nvPr>
+            <p:ph type="body" idx="1"/>
+          </p:nvPr>
+        </p:nvSpPr>
+        <p:spPr/>
+        <p:txBody>
+          <a:bodyPr/>
+          <a:lstStyle/>
+          <a:p>
+            <a:r>
+              <a:rPr lang="de-DE" dirty="0"/>
+              <a:t>Dies kann in verschiedenen Religionen auf unterschiedliche Weise gesehen werden, aber einige Beispiele umfassen radikale Islamisten, die daran glauben, Gewalt anzuwenden, um ihren Glauben zu verbreiten, und extremistische Christen, die glauben, dass jeder verfolgt werden sollte, der nicht ihrer spezifischen Interpretation der Bibel folgt.</a:t>
+            </a:r>
+          </a:p>
+        </p:txBody>
+      </p:sp>
+      <p:sp>
+        <p:nvSpPr>
+          <p:cNvPr id="4" name="Foliennummernplatzhalter 3"/>
+          <p:cNvSpPr>
+            <a:spLocks noGrp="1"/>
+          </p:cNvSpPr>
+          <p:nvPr>
+            <p:ph type="sldNum" sz="quarter" idx="5"/>
+          </p:nvPr>
+        </p:nvSpPr>
+        <p:spPr/>
+        <p:txBody>
+          <a:bodyPr/>
+          <a:lstStyle/>
+          <a:p>
+            <a:fld id="{4233C98D-1887-4C32-815E-C2076787E276}" type="slidenum">
+              <a:rPr lang="de-DE" smtClean="0"/>
+              <a:t>4</a:t>
+            </a:fld>
+            <a:endParaRPr lang="de-DE"/>
+          </a:p>
+        </p:txBody>
+      </p:sp>
+    </p:spTree>
+    <p:extLst>
+      <p:ext uri="{BB962C8B-B14F-4D97-AF65-F5344CB8AC3E}">
+        <p14:creationId xmlns:p14="http://schemas.microsoft.com/office/powerpoint/2010/main" val="2579315128"/>
+      </p:ext>
+    </p:extLst>
+  </p:cSld>
+  <p:clrMapOvr>
+    <a:masterClrMapping/>
+  </p:clrMapOvr>
+</p:notes>
+</file>
+
+<file path=ppt/notesSlides/notesSlide5.xml><?xml version="1.0" encoding="utf-8"?>
+<p:notes xmlns:a="http://schemas.openxmlformats.org/drawingml/2006/main" xmlns:r="http://schemas.openxmlformats.org/officeDocument/2006/relationships" xmlns:p="http://schemas.openxmlformats.org/presentationml/2006/main">
+  <p:cSld>
+    <p:spTree>
+      <p:nvGrpSpPr>
+        <p:cNvPr id="1" name=""/>
+        <p:cNvGrpSpPr/>
+        <p:nvPr/>
+      </p:nvGrpSpPr>
+      <p:grpSpPr>
+        <a:xfrm>
+          <a:off x="0" y="0"/>
+          <a:ext cx="0" cy="0"/>
+          <a:chOff x="0" y="0"/>
+          <a:chExt cx="0" cy="0"/>
+        </a:xfrm>
+      </p:grpSpPr>
+      <p:sp>
+        <p:nvSpPr>
+          <p:cNvPr id="2" name="Folienbildplatzhalter 1"/>
+          <p:cNvSpPr>
+            <a:spLocks noGrp="1" noRot="1" noChangeAspect="1"/>
+          </p:cNvSpPr>
+          <p:nvPr>
+            <p:ph type="sldImg"/>
+          </p:nvPr>
+        </p:nvSpPr>
+        <p:spPr/>
+      </p:sp>
+      <p:sp>
+        <p:nvSpPr>
+          <p:cNvPr id="3" name="Notizenplatzhalter 2"/>
+          <p:cNvSpPr>
+            <a:spLocks noGrp="1"/>
+          </p:cNvSpPr>
+          <p:nvPr>
+            <p:ph type="body" idx="1"/>
+          </p:nvPr>
+        </p:nvSpPr>
+        <p:spPr/>
+        <p:txBody>
+          <a:bodyPr/>
+          <a:lstStyle/>
+          <a:p>
+            <a:r>
+              <a:rPr lang="de-DE" dirty="0"/>
+              <a:t>Einige Beispiele für religiösen Extremismus sind:</a:t>
+            </a:r>
+          </a:p>
+        </p:txBody>
+      </p:sp>
+      <p:sp>
+        <p:nvSpPr>
+          <p:cNvPr id="4" name="Foliennummernplatzhalter 3"/>
+          <p:cNvSpPr>
+            <a:spLocks noGrp="1"/>
+          </p:cNvSpPr>
+          <p:nvPr>
+            <p:ph type="sldNum" sz="quarter" idx="5"/>
+          </p:nvPr>
+        </p:nvSpPr>
+        <p:spPr/>
+        <p:txBody>
+          <a:bodyPr/>
+          <a:lstStyle/>
+          <a:p>
+            <a:fld id="{4233C98D-1887-4C32-815E-C2076787E276}" type="slidenum">
+              <a:rPr lang="de-DE" smtClean="0"/>
+              <a:t>5</a:t>
+            </a:fld>
+            <a:endParaRPr lang="de-DE"/>
+          </a:p>
+        </p:txBody>
+      </p:sp>
+    </p:spTree>
+    <p:extLst>
+      <p:ext uri="{BB962C8B-B14F-4D97-AF65-F5344CB8AC3E}">
+        <p14:creationId xmlns:p14="http://schemas.microsoft.com/office/powerpoint/2010/main" val="376682566"/>
+      </p:ext>
+    </p:extLst>
+  </p:cSld>
+  <p:clrMapOvr>
+    <a:masterClrMapping/>
+  </p:clrMapOvr>
+</p:notes>
+</file>
+
+<file path=ppt/notesSlides/notesSlide6.xml><?xml version="1.0" encoding="utf-8"?>
+<p:notes xmlns:a="http://schemas.openxmlformats.org/drawingml/2006/main" xmlns:r="http://schemas.openxmlformats.org/officeDocument/2006/relationships" xmlns:p="http://schemas.openxmlformats.org/presentationml/2006/main">
+  <p:cSld>
+    <p:spTree>
+      <p:nvGrpSpPr>
+        <p:cNvPr id="1" name=""/>
+        <p:cNvGrpSpPr/>
+        <p:nvPr/>
+      </p:nvGrpSpPr>
+      <p:grpSpPr>
+        <a:xfrm>
+          <a:off x="0" y="0"/>
+          <a:ext cx="0" cy="0"/>
+          <a:chOff x="0" y="0"/>
+          <a:chExt cx="0" cy="0"/>
+        </a:xfrm>
+      </p:grpSpPr>
+      <p:sp>
+        <p:nvSpPr>
+          <p:cNvPr id="2" name="Folienbildplatzhalter 1"/>
+          <p:cNvSpPr>
+            <a:spLocks noGrp="1" noRot="1" noChangeAspect="1"/>
+          </p:cNvSpPr>
+          <p:nvPr>
+            <p:ph type="sldImg"/>
+          </p:nvPr>
+        </p:nvSpPr>
+        <p:spPr/>
+      </p:sp>
+      <p:sp>
+        <p:nvSpPr>
+          <p:cNvPr id="3" name="Notizenplatzhalter 2"/>
+          <p:cNvSpPr>
+            <a:spLocks noGrp="1"/>
+          </p:cNvSpPr>
+          <p:nvPr>
+            <p:ph type="body" idx="1"/>
+          </p:nvPr>
+        </p:nvSpPr>
+        <p:spPr/>
+        <p:txBody>
+          <a:bodyPr/>
+          <a:lstStyle/>
+          <a:p>
+            <a:r>
+              <a:rPr lang="de-DE" dirty="0"/>
+              <a:t>- die Anschläge vom 11. </a:t>
+            </a:r>
+            <a:r>
+              <a:rPr lang="de-DE" dirty="0" err="1"/>
+              <a:t>SeptemberDie</a:t>
+            </a:r>
+            <a:r>
+              <a:rPr lang="de-DE" dirty="0"/>
+              <a:t> Anschläge vom 11. September waren eine Serie von vier koordinierten Terroranschlägen der islamistischen Terrorgruppe Al-Qaida auf die Vereinigten Staaten am Morgen des 11. September 2001. Die Anschläge töteten 2.996 Menschen, verletzten über 6.000 weitere und verursachten mindestens 10 Milliarden Dollar an Infrastruktur- und </a:t>
+            </a:r>
+            <a:r>
+              <a:rPr lang="de-DE" dirty="0" err="1"/>
+              <a:t>Sachschäden.Die</a:t>
+            </a:r>
+            <a:r>
+              <a:rPr lang="de-DE" dirty="0"/>
+              <a:t> Anschläge waren der tödlichste Terroranschlag auf US-amerikanischem Boden in der Geschichte und lösten die größte eintägige Mobilisierung von Strafverfolgungspersonal in der Geschichte der USA aus, wobei etwa 40.000 Beamte nach New York City entsandt wurden.</a:t>
+            </a:r>
+          </a:p>
+        </p:txBody>
+      </p:sp>
+      <p:sp>
+        <p:nvSpPr>
+          <p:cNvPr id="4" name="Foliennummernplatzhalter 3"/>
+          <p:cNvSpPr>
+            <a:spLocks noGrp="1"/>
+          </p:cNvSpPr>
+          <p:nvPr>
+            <p:ph type="sldNum" sz="quarter" idx="5"/>
+          </p:nvPr>
+        </p:nvSpPr>
+        <p:spPr/>
+        <p:txBody>
+          <a:bodyPr/>
+          <a:lstStyle/>
+          <a:p>
+            <a:fld id="{4233C98D-1887-4C32-815E-C2076787E276}" type="slidenum">
+              <a:rPr lang="de-DE" smtClean="0"/>
+              <a:t>6</a:t>
+            </a:fld>
+            <a:endParaRPr lang="de-DE"/>
+          </a:p>
+        </p:txBody>
+      </p:sp>
+    </p:spTree>
+    <p:extLst>
+      <p:ext uri="{BB962C8B-B14F-4D97-AF65-F5344CB8AC3E}">
+        <p14:creationId xmlns:p14="http://schemas.microsoft.com/office/powerpoint/2010/main" val="3254494586"/>
+      </p:ext>
+    </p:extLst>
+  </p:cSld>
+  <p:clrMapOvr>
+    <a:masterClrMapping/>
+  </p:clrMapOvr>
+</p:notes>
+</file>
+
+<file path=ppt/notesSlides/notesSlide7.xml><?xml version="1.0" encoding="utf-8"?>
+<p:notes xmlns:a="http://schemas.openxmlformats.org/drawingml/2006/main" xmlns:r="http://schemas.openxmlformats.org/officeDocument/2006/relationships" xmlns:p="http://schemas.openxmlformats.org/presentationml/2006/main">
+  <p:cSld>
+    <p:spTree>
+      <p:nvGrpSpPr>
+        <p:cNvPr id="1" name=""/>
+        <p:cNvGrpSpPr/>
+        <p:nvPr/>
+      </p:nvGrpSpPr>
+      <p:grpSpPr>
+        <a:xfrm>
+          <a:off x="0" y="0"/>
+          <a:ext cx="0" cy="0"/>
+          <a:chOff x="0" y="0"/>
+          <a:chExt cx="0" cy="0"/>
+        </a:xfrm>
+      </p:grpSpPr>
+      <p:sp>
+        <p:nvSpPr>
+          <p:cNvPr id="2" name="Folienbildplatzhalter 1"/>
+          <p:cNvSpPr>
+            <a:spLocks noGrp="1" noRot="1" noChangeAspect="1"/>
+          </p:cNvSpPr>
+          <p:nvPr>
+            <p:ph type="sldImg"/>
+          </p:nvPr>
+        </p:nvSpPr>
+        <p:spPr/>
+      </p:sp>
+      <p:sp>
+        <p:nvSpPr>
+          <p:cNvPr id="3" name="Notizenplatzhalter 2"/>
+          <p:cNvSpPr>
+            <a:spLocks noGrp="1"/>
+          </p:cNvSpPr>
+          <p:nvPr>
+            <p:ph type="body" idx="1"/>
+          </p:nvPr>
+        </p:nvSpPr>
+        <p:spPr/>
+        <p:txBody>
+          <a:bodyPr/>
+          <a:lstStyle/>
+          <a:p>
+            <a:r>
+              <a:rPr lang="de-DE" dirty="0"/>
+              <a:t>- Die Zerstörung der Bamiyan-Buddhas durch die Taliban in </a:t>
+            </a:r>
+            <a:r>
+              <a:rPr lang="de-DE" dirty="0" err="1"/>
+              <a:t>AfghanistanDie</a:t>
+            </a:r>
+            <a:r>
+              <a:rPr lang="de-DE" dirty="0"/>
+              <a:t> Bamiyan-Buddhas waren zwei große Statuen stehender Buddhas, die in die Seite einer Klippe im </a:t>
+            </a:r>
+            <a:r>
+              <a:rPr lang="de-DE" dirty="0" err="1"/>
+              <a:t>Bamiyan</a:t>
+            </a:r>
+            <a:r>
+              <a:rPr lang="de-DE" dirty="0"/>
+              <a:t>-Tal in der Region </a:t>
+            </a:r>
+            <a:r>
+              <a:rPr lang="de-DE" dirty="0" err="1"/>
+              <a:t>Hazarajat</a:t>
+            </a:r>
+            <a:r>
+              <a:rPr lang="de-DE" dirty="0"/>
+              <a:t> in Zentralafghanistan gehauen wurden. Sie waren die größten Beispiele für stehende Buddhas der Welt und wahrscheinlich die berühmtesten buddhistischen Relikte in Afghanistan.</a:t>
+            </a:r>
+          </a:p>
+        </p:txBody>
+      </p:sp>
+      <p:sp>
+        <p:nvSpPr>
+          <p:cNvPr id="4" name="Foliennummernplatzhalter 3"/>
+          <p:cNvSpPr>
+            <a:spLocks noGrp="1"/>
+          </p:cNvSpPr>
+          <p:nvPr>
+            <p:ph type="sldNum" sz="quarter" idx="5"/>
+          </p:nvPr>
+        </p:nvSpPr>
+        <p:spPr/>
+        <p:txBody>
+          <a:bodyPr/>
+          <a:lstStyle/>
+          <a:p>
+            <a:fld id="{4233C98D-1887-4C32-815E-C2076787E276}" type="slidenum">
+              <a:rPr lang="de-DE" smtClean="0"/>
+              <a:t>7</a:t>
+            </a:fld>
+            <a:endParaRPr lang="de-DE"/>
+          </a:p>
+        </p:txBody>
+      </p:sp>
+    </p:spTree>
+    <p:extLst>
+      <p:ext uri="{BB962C8B-B14F-4D97-AF65-F5344CB8AC3E}">
+        <p14:creationId xmlns:p14="http://schemas.microsoft.com/office/powerpoint/2010/main" val="305253317"/>
+      </p:ext>
+    </p:extLst>
+  </p:cSld>
+  <p:clrMapOvr>
+    <a:masterClrMapping/>
+  </p:clrMapOvr>
+</p:notes>
+</file>
+
+<file path=ppt/notesSlides/notesSlide8.xml><?xml version="1.0" encoding="utf-8"?>
+<p:notes xmlns:a="http://schemas.openxmlformats.org/drawingml/2006/main" xmlns:r="http://schemas.openxmlformats.org/officeDocument/2006/relationships" xmlns:p="http://schemas.openxmlformats.org/presentationml/2006/main">
+  <p:cSld>
+    <p:spTree>
+      <p:nvGrpSpPr>
+        <p:cNvPr id="1" name=""/>
+        <p:cNvGrpSpPr/>
+        <p:nvPr/>
+      </p:nvGrpSpPr>
+      <p:grpSpPr>
+        <a:xfrm>
+          <a:off x="0" y="0"/>
+          <a:ext cx="0" cy="0"/>
+          <a:chOff x="0" y="0"/>
+          <a:chExt cx="0" cy="0"/>
+        </a:xfrm>
+      </p:grpSpPr>
+      <p:sp>
+        <p:nvSpPr>
+          <p:cNvPr id="2" name="Folienbildplatzhalter 1"/>
+          <p:cNvSpPr>
+            <a:spLocks noGrp="1" noRot="1" noChangeAspect="1"/>
+          </p:cNvSpPr>
+          <p:nvPr>
+            <p:ph type="sldImg"/>
+          </p:nvPr>
+        </p:nvSpPr>
+        <p:spPr/>
+      </p:sp>
+      <p:sp>
+        <p:nvSpPr>
+          <p:cNvPr id="3" name="Notizenplatzhalter 2"/>
+          <p:cNvSpPr>
+            <a:spLocks noGrp="1"/>
+          </p:cNvSpPr>
+          <p:nvPr>
+            <p:ph type="body" idx="1"/>
+          </p:nvPr>
+        </p:nvSpPr>
+        <p:spPr/>
+        <p:txBody>
+          <a:bodyPr/>
+          <a:lstStyle/>
+          <a:p>
+            <a:r>
+              <a:rPr lang="de-DE" dirty="0"/>
+              <a:t>3. Was sind die Ursachen für religiösen </a:t>
+            </a:r>
+            <a:r>
+              <a:rPr lang="de-DE" dirty="0" err="1"/>
+              <a:t>Extremismus?Auf</a:t>
+            </a:r>
+            <a:r>
+              <a:rPr lang="de-DE" dirty="0"/>
+              <a:t> diese Frage gibt es keine allgemeingültige Antwort, da es viele verschiedene Ursachen für religiösen Extremismus geben kann. Einige mögliche Ursachen könnten der Wunsch sein, seine Überzeugungen vor wahrgenommenen Bedrohungen zu schützen, das Gefühl, von der Gesellschaft angegriffen oder ausgegrenzt zu werden, oder das Bedürfnis, einer Gruppe oder Gemeinschaft anzugehören. Darüber hinaus kann religiöser Extremismus manchmal durch politische oder wirtschaftliche Faktoren, wie z. B. den Wunsch, Macht oder Kontrolle zu erlangen, angeheizt werden. </a:t>
+            </a:r>
+          </a:p>
+        </p:txBody>
+      </p:sp>
+      <p:sp>
+        <p:nvSpPr>
+          <p:cNvPr id="4" name="Foliennummernplatzhalter 3"/>
+          <p:cNvSpPr>
+            <a:spLocks noGrp="1"/>
+          </p:cNvSpPr>
+          <p:nvPr>
+            <p:ph type="sldNum" sz="quarter" idx="5"/>
+          </p:nvPr>
+        </p:nvSpPr>
+        <p:spPr/>
+        <p:txBody>
+          <a:bodyPr/>
+          <a:lstStyle/>
+          <a:p>
+            <a:fld id="{4233C98D-1887-4C32-815E-C2076787E276}" type="slidenum">
+              <a:rPr lang="de-DE" smtClean="0"/>
+              <a:t>8</a:t>
+            </a:fld>
+            <a:endParaRPr lang="de-DE"/>
+          </a:p>
+        </p:txBody>
+      </p:sp>
+    </p:spTree>
+    <p:extLst>
+      <p:ext uri="{BB962C8B-B14F-4D97-AF65-F5344CB8AC3E}">
+        <p14:creationId xmlns:p14="http://schemas.microsoft.com/office/powerpoint/2010/main" val="3997093280"/>
+      </p:ext>
+    </p:extLst>
+  </p:cSld>
+  <p:clrMapOvr>
+    <a:masterClrMapping/>
+  </p:clrMapOvr>
+</p:notes>
+</file>
+
+<file path=ppt/notesSlides/notesSlide9.xml><?xml version="1.0" encoding="utf-8"?>
+<p:notes xmlns:a="http://schemas.openxmlformats.org/drawingml/2006/main" xmlns:r="http://schemas.openxmlformats.org/officeDocument/2006/relationships" xmlns:p="http://schemas.openxmlformats.org/presentationml/2006/main">
+  <p:cSld>
+    <p:spTree>
+      <p:nvGrpSpPr>
+        <p:cNvPr id="1" name=""/>
+        <p:cNvGrpSpPr/>
+        <p:nvPr/>
+      </p:nvGrpSpPr>
+      <p:grpSpPr>
+        <a:xfrm>
+          <a:off x="0" y="0"/>
+          <a:ext cx="0" cy="0"/>
+          <a:chOff x="0" y="0"/>
+          <a:chExt cx="0" cy="0"/>
+        </a:xfrm>
+      </p:grpSpPr>
+      <p:sp>
+        <p:nvSpPr>
+          <p:cNvPr id="2" name="Folienbildplatzhalter 1"/>
+          <p:cNvSpPr>
+            <a:spLocks noGrp="1" noRot="1" noChangeAspect="1"/>
+          </p:cNvSpPr>
+          <p:nvPr>
+            <p:ph type="sldImg"/>
+          </p:nvPr>
+        </p:nvSpPr>
+        <p:spPr/>
+      </p:sp>
+      <p:sp>
+        <p:nvSpPr>
+          <p:cNvPr id="3" name="Notizenplatzhalter 2"/>
+          <p:cNvSpPr>
+            <a:spLocks noGrp="1"/>
+          </p:cNvSpPr>
+          <p:nvPr>
+            <p:ph type="body" idx="1"/>
+          </p:nvPr>
+        </p:nvSpPr>
+        <p:spPr/>
+        <p:txBody>
+          <a:bodyPr/>
+          <a:lstStyle/>
+          <a:p>
+            <a:r>
+              <a:rPr lang="de-DE" dirty="0"/>
+              <a:t>3. Was sind die Ursachen für religiösen </a:t>
+            </a:r>
+            <a:r>
+              <a:rPr lang="de-DE" dirty="0" err="1"/>
+              <a:t>Extremismus?Auf</a:t>
+            </a:r>
+            <a:r>
+              <a:rPr lang="de-DE" dirty="0"/>
+              <a:t> diese Frage gibt es keine allgemeingültige Antwort, da es viele verschiedene Ursachen für religiösen Extremismus geben kann. Einige mögliche Ursachen könnten der Wunsch sein, seine Überzeugungen vor wahrgenommenen Bedrohungen zu schützen, das Gefühl, von der Gesellschaft angegriffen oder ausgegrenzt zu werden, oder das Bedürfnis, einer Gruppe oder Gemeinschaft anzugehören. Darüber hinaus kann religiöser Extremismus manchmal durch politische oder wirtschaftliche Faktoren, wie z. B. den Wunsch, Macht oder Kontrolle zu erlangen, angeheizt werden. </a:t>
+            </a:r>
+          </a:p>
+        </p:txBody>
+      </p:sp>
+      <p:sp>
+        <p:nvSpPr>
+          <p:cNvPr id="4" name="Foliennummernplatzhalter 3"/>
+          <p:cNvSpPr>
+            <a:spLocks noGrp="1"/>
+          </p:cNvSpPr>
+          <p:nvPr>
+            <p:ph type="sldNum" sz="quarter" idx="5"/>
+          </p:nvPr>
+        </p:nvSpPr>
+        <p:spPr/>
+        <p:txBody>
+          <a:bodyPr/>
+          <a:lstStyle/>
+          <a:p>
+            <a:fld id="{4233C98D-1887-4C32-815E-C2076787E276}" type="slidenum">
+              <a:rPr lang="de-DE" smtClean="0"/>
+              <a:t>9</a:t>
+            </a:fld>
+            <a:endParaRPr lang="de-DE"/>
+          </a:p>
+        </p:txBody>
+      </p:sp>
+    </p:spTree>
+    <p:extLst>
+      <p:ext uri="{BB962C8B-B14F-4D97-AF65-F5344CB8AC3E}">
+        <p14:creationId xmlns:p14="http://schemas.microsoft.com/office/powerpoint/2010/main" val="102352850"/>
+      </p:ext>
+    </p:extLst>
+  </p:cSld>
+  <p:clrMapOvr>
+    <a:masterClrMapping/>
+  </p:clrMapOvr>
+</p:notes>
+</file>
+
 <file path=ppt/slideLayouts/slideLayout1.xml><?xml version="1.0" encoding="utf-8"?>
 <p:sldLayout xmlns:a="http://schemas.openxmlformats.org/drawingml/2006/main" xmlns:r="http://schemas.openxmlformats.org/officeDocument/2006/relationships" xmlns:p="http://schemas.openxmlformats.org/presentationml/2006/main" type="title" preserve="1">
   <p:cSld name="Title Slide">
@@ -281,7 +1578,7 @@
           <a:p>
             <a:fld id="{8C1E1FAD-7351-4908-963A-08EA8E4AB7A0}" type="datetimeFigureOut">
               <a:rPr lang="en-US" smtClean="0"/>
-              <a:t>6/25/2022</a:t>
+              <a:t>6/26/2022</a:t>
             </a:fld>
             <a:endParaRPr lang="en-US"/>
           </a:p>
@@ -479,7 +1776,7 @@
           <a:p>
             <a:fld id="{8C1E1FAD-7351-4908-963A-08EA8E4AB7A0}" type="datetimeFigureOut">
               <a:rPr lang="en-US" smtClean="0"/>
-              <a:t>6/25/2022</a:t>
+              <a:t>6/26/2022</a:t>
             </a:fld>
             <a:endParaRPr lang="en-US"/>
           </a:p>
@@ -687,7 +1984,7 @@
           <a:p>
             <a:fld id="{8C1E1FAD-7351-4908-963A-08EA8E4AB7A0}" type="datetimeFigureOut">
               <a:rPr lang="en-US" smtClean="0"/>
-              <a:t>6/25/2022</a:t>
+              <a:t>6/26/2022</a:t>
             </a:fld>
             <a:endParaRPr lang="en-US"/>
           </a:p>
@@ -916,7 +2213,7 @@
           <a:p>
             <a:fld id="{8C1E1FAD-7351-4908-963A-08EA8E4AB7A0}" type="datetimeFigureOut">
               <a:rPr lang="en-US" smtClean="0"/>
-              <a:t>6/25/2022</a:t>
+              <a:t>6/26/2022</a:t>
             </a:fld>
             <a:endParaRPr lang="en-US"/>
           </a:p>
@@ -1193,7 +2490,7 @@
           <a:p>
             <a:fld id="{8C1E1FAD-7351-4908-963A-08EA8E4AB7A0}" type="datetimeFigureOut">
               <a:rPr lang="en-US" smtClean="0"/>
-              <a:t>6/25/2022</a:t>
+              <a:t>6/26/2022</a:t>
             </a:fld>
             <a:endParaRPr lang="en-US"/>
           </a:p>
@@ -1458,7 +2755,7 @@
           <a:p>
             <a:fld id="{8C1E1FAD-7351-4908-963A-08EA8E4AB7A0}" type="datetimeFigureOut">
               <a:rPr lang="en-US" smtClean="0"/>
-              <a:t>6/25/2022</a:t>
+              <a:t>6/26/2022</a:t>
             </a:fld>
             <a:endParaRPr lang="en-US"/>
           </a:p>
@@ -1874,7 +3171,7 @@
           <a:p>
             <a:fld id="{8C1E1FAD-7351-4908-963A-08EA8E4AB7A0}" type="datetimeFigureOut">
               <a:rPr lang="en-US" smtClean="0"/>
-              <a:t>6/25/2022</a:t>
+              <a:t>6/26/2022</a:t>
             </a:fld>
             <a:endParaRPr lang="en-US"/>
           </a:p>
@@ -2020,7 +3317,7 @@
           <a:p>
             <a:fld id="{8C1E1FAD-7351-4908-963A-08EA8E4AB7A0}" type="datetimeFigureOut">
               <a:rPr lang="en-US" smtClean="0"/>
-              <a:t>6/25/2022</a:t>
+              <a:t>6/26/2022</a:t>
             </a:fld>
             <a:endParaRPr lang="en-US"/>
           </a:p>
@@ -2133,7 +3430,7 @@
           <a:p>
             <a:fld id="{8C1E1FAD-7351-4908-963A-08EA8E4AB7A0}" type="datetimeFigureOut">
               <a:rPr lang="en-US" smtClean="0"/>
-              <a:t>6/25/2022</a:t>
+              <a:t>6/26/2022</a:t>
             </a:fld>
             <a:endParaRPr lang="en-US"/>
           </a:p>
@@ -2448,7 +3745,7 @@
           <a:p>
             <a:fld id="{8C1E1FAD-7351-4908-963A-08EA8E4AB7A0}" type="datetimeFigureOut">
               <a:rPr lang="en-US" smtClean="0"/>
-              <a:t>6/25/2022</a:t>
+              <a:t>6/26/2022</a:t>
             </a:fld>
             <a:endParaRPr lang="en-US"/>
           </a:p>
@@ -2741,7 +4038,7 @@
           <a:p>
             <a:fld id="{8C1E1FAD-7351-4908-963A-08EA8E4AB7A0}" type="datetimeFigureOut">
               <a:rPr lang="en-US" smtClean="0"/>
-              <a:t>6/25/2022</a:t>
+              <a:t>6/26/2022</a:t>
             </a:fld>
             <a:endParaRPr lang="en-US"/>
           </a:p>
@@ -2980,7 +4277,7 @@
           <a:p>
             <a:fld id="{8C1E1FAD-7351-4908-963A-08EA8E4AB7A0}" type="datetimeFigureOut">
               <a:rPr lang="en-US" smtClean="0"/>
-              <a:t>6/25/2022</a:t>
+              <a:t>6/26/2022</a:t>
             </a:fld>
             <a:endParaRPr lang="en-US"/>
           </a:p>
@@ -4508,7 +5805,7 @@
             </a:pathLst>
           </a:custGeom>
           <a:blipFill>
-            <a:blip r:embed="rId2"/>
+            <a:blip r:embed="rId3"/>
             <a:tile tx="0" ty="0" sx="100000" sy="100000" flip="none" algn="tl"/>
           </a:blipFill>
           <a:ln w="12700" cap="flat" cmpd="sng" algn="ctr">
@@ -4560,7 +5857,7 @@
           <p:nvPr/>
         </p:nvPicPr>
         <p:blipFill rotWithShape="1">
-          <a:blip r:embed="rId3">
+          <a:blip r:embed="rId4">
             <a:alphaModFix amt="84000"/>
           </a:blip>
           <a:srcRect r="-1" b="6173"/>
@@ -6779,6 +8076,278 @@
 <file path=ppt/slides/slide10.xml><?xml version="1.0" encoding="utf-8"?>
 <p:sld xmlns:a="http://schemas.openxmlformats.org/drawingml/2006/main" xmlns:r="http://schemas.openxmlformats.org/officeDocument/2006/relationships" xmlns:p="http://schemas.openxmlformats.org/presentationml/2006/main">
   <p:cSld>
+    <p:spTree>
+      <p:nvGrpSpPr>
+        <p:cNvPr id="1" name=""/>
+        <p:cNvGrpSpPr/>
+        <p:nvPr/>
+      </p:nvGrpSpPr>
+      <p:grpSpPr>
+        <a:xfrm>
+          <a:off x="0" y="0"/>
+          <a:ext cx="0" cy="0"/>
+          <a:chOff x="0" y="0"/>
+          <a:chExt cx="0" cy="0"/>
+        </a:xfrm>
+      </p:grpSpPr>
+      <p:sp>
+        <p:nvSpPr>
+          <p:cNvPr id="2" name="Titel 1">
+            <a:extLst>
+              <a:ext uri="{FF2B5EF4-FFF2-40B4-BE49-F238E27FC236}">
+                <a16:creationId xmlns:a16="http://schemas.microsoft.com/office/drawing/2014/main" id="{88DE2A4A-CB4D-1D9F-8B9A-6103EAC0C0F9}"/>
+              </a:ext>
+            </a:extLst>
+          </p:cNvPr>
+          <p:cNvSpPr>
+            <a:spLocks noGrp="1"/>
+          </p:cNvSpPr>
+          <p:nvPr>
+            <p:ph type="title"/>
+          </p:nvPr>
+        </p:nvSpPr>
+        <p:spPr/>
+        <p:txBody>
+          <a:bodyPr/>
+          <a:lstStyle/>
+          <a:p>
+            <a:r>
+              <a:rPr lang="de-DE" i="0" dirty="0">
+                <a:highlight>
+                  <a:srgbClr val="00FFFF"/>
+                </a:highlight>
+                <a:ea typeface="+mj-lt"/>
+                <a:cs typeface="+mj-lt"/>
+              </a:rPr>
+              <a:t>5. Wie kann religiöser Extremismus verhindert werden?</a:t>
+            </a:r>
+            <a:endParaRPr lang="de-DE" dirty="0">
+              <a:highlight>
+                <a:srgbClr val="00FFFF"/>
+              </a:highlight>
+            </a:endParaRPr>
+          </a:p>
+        </p:txBody>
+      </p:sp>
+      <p:sp>
+        <p:nvSpPr>
+          <p:cNvPr id="3" name="Inhaltsplatzhalter 2">
+            <a:extLst>
+              <a:ext uri="{FF2B5EF4-FFF2-40B4-BE49-F238E27FC236}">
+                <a16:creationId xmlns:a16="http://schemas.microsoft.com/office/drawing/2014/main" id="{054EFC14-0F57-CBC4-C9E9-F6272DFFD86E}"/>
+              </a:ext>
+            </a:extLst>
+          </p:cNvPr>
+          <p:cNvSpPr>
+            <a:spLocks noGrp="1"/>
+          </p:cNvSpPr>
+          <p:nvPr>
+            <p:ph idx="1"/>
+          </p:nvPr>
+        </p:nvSpPr>
+        <p:spPr/>
+        <p:txBody>
+          <a:bodyPr vert="horz" lIns="91440" tIns="45720" rIns="91440" bIns="45720" rtlCol="0" anchor="t">
+            <a:normAutofit/>
+          </a:bodyPr>
+          <a:lstStyle/>
+          <a:p>
+            <a:r>
+              <a:rPr lang="de-DE" sz="2000" dirty="0"/>
+              <a:t>Bereitstellen von Bildungsangeboten</a:t>
+            </a:r>
+          </a:p>
+          <a:p>
+            <a:r>
+              <a:rPr lang="de-DE" sz="2000" dirty="0"/>
+              <a:t>Förderung des Dialogs und der Debatte zwischen religiösen Gruppen</a:t>
+            </a:r>
+          </a:p>
+          <a:p>
+            <a:r>
+              <a:rPr lang="de-DE" sz="2000" dirty="0"/>
+              <a:t>Förderung des Säkularismus</a:t>
+            </a:r>
+          </a:p>
+          <a:p>
+            <a:r>
+              <a:rPr lang="de-DE" sz="2000" dirty="0"/>
+              <a:t>Lösen von sozialer und wirtschaftlichen Missständen</a:t>
+            </a:r>
+          </a:p>
+          <a:p>
+            <a:r>
+              <a:rPr lang="de-DE" sz="2000" dirty="0"/>
+              <a:t>Finanzierung und Rekrutierung von Extremisten stoppen</a:t>
+            </a:r>
+          </a:p>
+        </p:txBody>
+      </p:sp>
+      <p:sp>
+        <p:nvSpPr>
+          <p:cNvPr id="4" name="Titel 1">
+            <a:extLst>
+              <a:ext uri="{FF2B5EF4-FFF2-40B4-BE49-F238E27FC236}">
+                <a16:creationId xmlns:a16="http://schemas.microsoft.com/office/drawing/2014/main" id="{608F759F-9B20-5C14-099E-E72EA758636D}"/>
+              </a:ext>
+            </a:extLst>
+          </p:cNvPr>
+          <p:cNvSpPr txBox="1">
+            <a:spLocks/>
+          </p:cNvSpPr>
+          <p:nvPr/>
+        </p:nvSpPr>
+        <p:spPr>
+          <a:xfrm>
+            <a:off x="3056540" y="6858000"/>
+            <a:ext cx="9135460" cy="2863778"/>
+          </a:xfrm>
+          <a:prstGeom prst="rect">
+            <a:avLst/>
+          </a:prstGeom>
+        </p:spPr>
+        <p:txBody>
+          <a:bodyPr vert="horz" lIns="91440" tIns="45720" rIns="91440" bIns="45720" rtlCol="0" anchor="b">
+            <a:normAutofit/>
+          </a:bodyPr>
+          <a:lstStyle>
+            <a:lvl1pPr algn="l" defTabSz="914400" rtl="0" eaLnBrk="1" latinLnBrk="0" hangingPunct="1">
+              <a:lnSpc>
+                <a:spcPct val="120000"/>
+              </a:lnSpc>
+              <a:spcBef>
+                <a:spcPct val="0"/>
+              </a:spcBef>
+              <a:buNone/>
+              <a:defRPr sz="4000" i="1" kern="1200">
+                <a:solidFill>
+                  <a:srgbClr val="000000"/>
+                </a:solidFill>
+                <a:highlight>
+                  <a:srgbClr val="FFFF00"/>
+                </a:highlight>
+                <a:latin typeface="+mj-lt"/>
+                <a:ea typeface="+mj-ea"/>
+                <a:cs typeface="+mj-cs"/>
+              </a:defRPr>
+            </a:lvl1pPr>
+          </a:lstStyle>
+          <a:p>
+            <a:pPr algn="r">
+              <a:spcAft>
+                <a:spcPts val="600"/>
+              </a:spcAft>
+            </a:pPr>
+            <a:r>
+              <a:rPr lang="en-US" sz="6600" i="1" kern="1200" dirty="0" err="1">
+                <a:solidFill>
+                  <a:srgbClr val="000000"/>
+                </a:solidFill>
+                <a:highlight>
+                  <a:srgbClr val="00FFFF"/>
+                </a:highlight>
+                <a:latin typeface="+mj-lt"/>
+                <a:ea typeface="+mj-ea"/>
+                <a:cs typeface="+mj-cs"/>
+              </a:rPr>
+              <a:t>Danke</a:t>
+            </a:r>
+            <a:r>
+              <a:rPr lang="en-US" sz="6600" i="1" kern="1200" dirty="0">
+                <a:solidFill>
+                  <a:srgbClr val="000000"/>
+                </a:solidFill>
+                <a:highlight>
+                  <a:srgbClr val="00FFFF"/>
+                </a:highlight>
+                <a:latin typeface="+mj-lt"/>
+                <a:ea typeface="+mj-ea"/>
+                <a:cs typeface="+mj-cs"/>
+              </a:rPr>
+              <a:t> </a:t>
+            </a:r>
+            <a:r>
+              <a:rPr lang="en-US" sz="6600" i="1" kern="1200" dirty="0" err="1">
+                <a:solidFill>
+                  <a:srgbClr val="000000"/>
+                </a:solidFill>
+                <a:highlight>
+                  <a:srgbClr val="00FFFF"/>
+                </a:highlight>
+                <a:latin typeface="+mj-lt"/>
+                <a:ea typeface="+mj-ea"/>
+                <a:cs typeface="+mj-cs"/>
+              </a:rPr>
+              <a:t>fürs</a:t>
+            </a:r>
+            <a:r>
+              <a:rPr lang="en-US" sz="6600" i="1" kern="1200" dirty="0">
+                <a:solidFill>
+                  <a:srgbClr val="000000"/>
+                </a:solidFill>
+                <a:highlight>
+                  <a:srgbClr val="00FFFF"/>
+                </a:highlight>
+                <a:latin typeface="+mj-lt"/>
+                <a:ea typeface="+mj-ea"/>
+                <a:cs typeface="+mj-cs"/>
+              </a:rPr>
+              <a:t> </a:t>
+            </a:r>
+            <a:r>
+              <a:rPr lang="en-US" sz="6600" i="1" kern="1200" dirty="0" err="1">
+                <a:solidFill>
+                  <a:srgbClr val="000000"/>
+                </a:solidFill>
+                <a:highlight>
+                  <a:srgbClr val="00FFFF"/>
+                </a:highlight>
+                <a:latin typeface="+mj-lt"/>
+                <a:ea typeface="+mj-ea"/>
+                <a:cs typeface="+mj-cs"/>
+              </a:rPr>
+              <a:t>Zuhören</a:t>
+            </a:r>
+            <a:endParaRPr lang="en-US" sz="6600" i="1" kern="1200" dirty="0">
+              <a:solidFill>
+                <a:srgbClr val="000000"/>
+              </a:solidFill>
+              <a:highlight>
+                <a:srgbClr val="00FFFF"/>
+              </a:highlight>
+              <a:latin typeface="+mj-lt"/>
+            </a:endParaRPr>
+          </a:p>
+        </p:txBody>
+      </p:sp>
+    </p:spTree>
+    <p:extLst>
+      <p:ext uri="{BB962C8B-B14F-4D97-AF65-F5344CB8AC3E}">
+        <p14:creationId xmlns:p14="http://schemas.microsoft.com/office/powerpoint/2010/main" val="627934862"/>
+      </p:ext>
+    </p:extLst>
+  </p:cSld>
+  <p:clrMapOvr>
+    <a:masterClrMapping/>
+  </p:clrMapOvr>
+  <mc:AlternateContent xmlns:mc="http://schemas.openxmlformats.org/markup-compatibility/2006" xmlns:p159="http://schemas.microsoft.com/office/powerpoint/2015/09/main">
+    <mc:Choice Requires="p159">
+      <p:transition xmlns:p14="http://schemas.microsoft.com/office/powerpoint/2010/main" spd="slow" p14:dur="2000">
+        <p159:morph option="byObject"/>
+      </p:transition>
+    </mc:Choice>
+    <mc:Fallback xmlns="">
+      <p:transition spd="slow">
+        <p:fade/>
+      </p:transition>
+    </mc:Fallback>
+  </mc:AlternateContent>
+</p:sld>
+</file>
+
+<file path=ppt/slides/slide11.xml><?xml version="1.0" encoding="utf-8"?>
+<p:sld xmlns:a="http://schemas.openxmlformats.org/drawingml/2006/main" xmlns:r="http://schemas.openxmlformats.org/officeDocument/2006/relationships" xmlns:p="http://schemas.openxmlformats.org/presentationml/2006/main">
+  <p:cSld>
     <p:bg>
       <p:bgPr>
         <a:solidFill>
@@ -7545,6 +9114,124 @@
 </p:sld>
 </file>
 
+<file path=ppt/slides/slide12.xml><?xml version="1.0" encoding="utf-8"?>
+<p:sld xmlns:a="http://schemas.openxmlformats.org/drawingml/2006/main" xmlns:r="http://schemas.openxmlformats.org/officeDocument/2006/relationships" xmlns:p="http://schemas.openxmlformats.org/presentationml/2006/main">
+  <p:cSld>
+    <p:spTree>
+      <p:nvGrpSpPr>
+        <p:cNvPr id="1" name=""/>
+        <p:cNvGrpSpPr/>
+        <p:nvPr/>
+      </p:nvGrpSpPr>
+      <p:grpSpPr>
+        <a:xfrm>
+          <a:off x="0" y="0"/>
+          <a:ext cx="0" cy="0"/>
+          <a:chOff x="0" y="0"/>
+          <a:chExt cx="0" cy="0"/>
+        </a:xfrm>
+      </p:grpSpPr>
+      <p:sp>
+        <p:nvSpPr>
+          <p:cNvPr id="2" name="Titel 1">
+            <a:extLst>
+              <a:ext uri="{FF2B5EF4-FFF2-40B4-BE49-F238E27FC236}">
+                <a16:creationId xmlns:a16="http://schemas.microsoft.com/office/drawing/2014/main" id="{5C29F590-39EA-13DC-DD9E-EF55CEB66304}"/>
+              </a:ext>
+            </a:extLst>
+          </p:cNvPr>
+          <p:cNvSpPr>
+            <a:spLocks noGrp="1"/>
+          </p:cNvSpPr>
+          <p:nvPr>
+            <p:ph type="title"/>
+          </p:nvPr>
+        </p:nvSpPr>
+        <p:spPr/>
+        <p:txBody>
+          <a:bodyPr/>
+          <a:lstStyle/>
+          <a:p>
+            <a:r>
+              <a:rPr lang="de-DE">
+                <a:highlight>
+                  <a:srgbClr val="00FFFF"/>
+                </a:highlight>
+              </a:rPr>
+              <a:t>Quellen</a:t>
+            </a:r>
+            <a:endParaRPr lang="de-DE" dirty="0">
+              <a:highlight>
+                <a:srgbClr val="00FFFF"/>
+              </a:highlight>
+            </a:endParaRPr>
+          </a:p>
+        </p:txBody>
+      </p:sp>
+      <p:sp>
+        <p:nvSpPr>
+          <p:cNvPr id="3" name="Inhaltsplatzhalter 2">
+            <a:extLst>
+              <a:ext uri="{FF2B5EF4-FFF2-40B4-BE49-F238E27FC236}">
+                <a16:creationId xmlns:a16="http://schemas.microsoft.com/office/drawing/2014/main" id="{7F04C38B-E6C7-5326-8E58-5E8A52D9ED59}"/>
+              </a:ext>
+            </a:extLst>
+          </p:cNvPr>
+          <p:cNvSpPr>
+            <a:spLocks noGrp="1"/>
+          </p:cNvSpPr>
+          <p:nvPr>
+            <p:ph idx="1"/>
+          </p:nvPr>
+        </p:nvSpPr>
+        <p:spPr/>
+        <p:txBody>
+          <a:bodyPr>
+            <a:normAutofit/>
+          </a:bodyPr>
+          <a:lstStyle/>
+          <a:p>
+            <a:r>
+              <a:rPr lang="de-DE" sz="2000" dirty="0"/>
+              <a:t>Wikipedia</a:t>
+            </a:r>
+          </a:p>
+          <a:p>
+            <a:r>
+              <a:rPr lang="de-DE" sz="2000" dirty="0"/>
+              <a:t>Bundeszentrale für politische Bildung</a:t>
+            </a:r>
+          </a:p>
+          <a:p>
+            <a:r>
+              <a:rPr lang="de-DE" sz="2000" dirty="0"/>
+              <a:t>Arte.TV</a:t>
+            </a:r>
+          </a:p>
+          <a:p>
+            <a:r>
+              <a:rPr lang="de-DE" sz="2000" dirty="0"/>
+              <a:t>WDR</a:t>
+            </a:r>
+          </a:p>
+          <a:p>
+            <a:endParaRPr lang="de-DE" sz="2000" dirty="0"/>
+          </a:p>
+        </p:txBody>
+      </p:sp>
+    </p:spTree>
+    <p:extLst>
+      <p:ext uri="{BB962C8B-B14F-4D97-AF65-F5344CB8AC3E}">
+        <p14:creationId xmlns:p14="http://schemas.microsoft.com/office/powerpoint/2010/main" val="2836983505"/>
+      </p:ext>
+    </p:extLst>
+  </p:cSld>
+  <p:clrMapOvr>
+    <a:masterClrMapping/>
+  </p:clrMapOvr>
+</p:sld>
+</file>
+
 <file path=ppt/slides/slide2.xml><?xml version="1.0" encoding="utf-8"?>
 <p:sld xmlns:a="http://schemas.openxmlformats.org/drawingml/2006/main" xmlns:r="http://schemas.openxmlformats.org/officeDocument/2006/relationships" xmlns:p="http://schemas.openxmlformats.org/presentationml/2006/main">
   <p:cSld>
@@ -7617,52 +9304,72 @@
           </a:bodyPr>
           <a:lstStyle/>
           <a:p>
+            <a:pPr marL="457200" indent="-457200">
+              <a:buFont typeface="+mj-lt"/>
+              <a:buAutoNum type="arabicPeriod"/>
+            </a:pPr>
             <a:r>
               <a:rPr lang="de-DE" sz="2000" dirty="0">
                 <a:ea typeface="+mn-lt"/>
                 <a:cs typeface="+mn-lt"/>
               </a:rPr>
-              <a:t>1. Was ist religiöser Extremismus</a:t>
+              <a:t>Was ist religiöser Extremismus</a:t>
             </a:r>
             <a:endParaRPr lang="de-DE" sz="2000" dirty="0"/>
           </a:p>
           <a:p>
+            <a:pPr marL="457200" indent="-457200">
+              <a:buFont typeface="+mj-lt"/>
+              <a:buAutoNum type="arabicPeriod"/>
+            </a:pPr>
             <a:r>
               <a:rPr lang="de-DE" sz="2000" dirty="0">
                 <a:ea typeface="+mn-lt"/>
                 <a:cs typeface="+mn-lt"/>
               </a:rPr>
-              <a:t>2. Was sind einige Beispiele für religiösen Extremismus</a:t>
+              <a:t>Was sind einige Beispiele für religiösen Extremismus</a:t>
             </a:r>
             <a:endParaRPr lang="de-DE" sz="2000" dirty="0"/>
           </a:p>
           <a:p>
+            <a:pPr marL="457200" indent="-457200">
+              <a:buFont typeface="+mj-lt"/>
+              <a:buAutoNum type="arabicPeriod"/>
+            </a:pPr>
             <a:r>
               <a:rPr lang="de-DE" sz="2000" dirty="0">
                 <a:ea typeface="+mn-lt"/>
                 <a:cs typeface="+mn-lt"/>
               </a:rPr>
-              <a:t>3. Was sind die Ursachen für religiösen Extremismus</a:t>
+              <a:t>Was sind die Ursachen für religiösen Extremismus</a:t>
             </a:r>
             <a:endParaRPr lang="de-DE" sz="2000" dirty="0"/>
           </a:p>
           <a:p>
+            <a:pPr marL="457200" indent="-457200">
+              <a:buFont typeface="+mj-lt"/>
+              <a:buAutoNum type="arabicPeriod"/>
+            </a:pPr>
             <a:r>
               <a:rPr lang="de-DE" sz="2000" dirty="0">
                 <a:ea typeface="+mn-lt"/>
                 <a:cs typeface="+mn-lt"/>
               </a:rPr>
-              <a:t>4. Welche Folgen hat religiöser Extremismus</a:t>
+              <a:t>Welche Folgen hat religiöser Extremismus</a:t>
             </a:r>
             <a:endParaRPr lang="de-DE" sz="2000" dirty="0"/>
           </a:p>
           <a:p>
+            <a:pPr marL="457200" indent="-457200">
+              <a:buFont typeface="+mj-lt"/>
+              <a:buAutoNum type="arabicPeriod"/>
+            </a:pPr>
             <a:r>
               <a:rPr lang="de-DE" sz="2000" dirty="0">
                 <a:ea typeface="+mn-lt"/>
                 <a:cs typeface="+mn-lt"/>
               </a:rPr>
-              <a:t>5. Wie kann religiöser Extremismus verhindert werden</a:t>
+              <a:t>Wie kann religiöser Extremismus verhindert werden</a:t>
             </a:r>
             <a:endParaRPr lang="de-DE" sz="2000" dirty="0"/>
           </a:p>
@@ -7687,6 +9394,14 @@
 <file path=ppt/slides/slide3.xml><?xml version="1.0" encoding="utf-8"?>
 <p:sld xmlns:a="http://schemas.openxmlformats.org/drawingml/2006/main" xmlns:r="http://schemas.openxmlformats.org/officeDocument/2006/relationships" xmlns:p="http://schemas.openxmlformats.org/presentationml/2006/main">
   <p:cSld>
+    <p:bg>
+      <p:bgPr>
+        <a:solidFill>
+          <a:schemeClr val="bg2"/>
+        </a:solidFill>
+        <a:effectLst/>
+      </p:bgPr>
+    </p:bg>
     <p:spTree>
       <p:nvGrpSpPr>
         <p:cNvPr id="1" name=""/>
@@ -7701,6 +9416,893 @@
           <a:chExt cx="0" cy="0"/>
         </a:xfrm>
       </p:grpSpPr>
+      <p:grpSp>
+        <p:nvGrpSpPr>
+          <p:cNvPr id="7" name="Group 6">
+            <a:extLst>
+              <a:ext uri="{FF2B5EF4-FFF2-40B4-BE49-F238E27FC236}">
+                <a16:creationId xmlns:a16="http://schemas.microsoft.com/office/drawing/2014/main" id="{23F5135F-115E-423C-BE4A-B56C35DC9F3E}"/>
+              </a:ext>
+              <a:ext uri="{C183D7F6-B498-43B3-948B-1728B52AA6E4}">
+                <adec:decorative xmlns:adec="http://schemas.microsoft.com/office/drawing/2017/decorative" val="1"/>
+              </a:ext>
+            </a:extLst>
+          </p:cNvPr>
+          <p:cNvGrpSpPr>
+            <a:grpSpLocks noGrp="1" noUngrp="1" noRot="1" noChangeAspect="1" noMove="1" noResize="1"/>
+          </p:cNvGrpSpPr>
+          <p:nvPr>
+            <p:extLst>
+              <p:ext uri="{386F3935-93C4-4BCD-93E2-E3B085C9AB24}">
+                <p16:designElem xmlns:p16="http://schemas.microsoft.com/office/powerpoint/2015/main" val="1"/>
+              </p:ext>
+            </p:extLst>
+          </p:nvPr>
+        </p:nvGrpSpPr>
+        <p:grpSpPr>
+          <a:xfrm>
+            <a:off x="174436" y="6388259"/>
+            <a:ext cx="358083" cy="368964"/>
+            <a:chOff x="4135740" y="1795926"/>
+            <a:chExt cx="558732" cy="575710"/>
+          </a:xfrm>
+        </p:grpSpPr>
+        <p:grpSp>
+          <p:nvGrpSpPr>
+            <p:cNvPr id="8" name="Group 7">
+              <a:extLst>
+                <a:ext uri="{FF2B5EF4-FFF2-40B4-BE49-F238E27FC236}">
+                  <a16:creationId xmlns:a16="http://schemas.microsoft.com/office/drawing/2014/main" id="{82C1E318-0F1F-4920-8C7D-FBAC66631B54}"/>
+                </a:ext>
+                <a:ext uri="{C183D7F6-B498-43B3-948B-1728B52AA6E4}">
+                  <adec:decorative xmlns:adec="http://schemas.microsoft.com/office/drawing/2017/decorative" val="1"/>
+                </a:ext>
+              </a:extLst>
+            </p:cNvPr>
+            <p:cNvGrpSpPr/>
+            <p:nvPr>
+              <p:extLst>
+                <p:ext uri="{386F3935-93C4-4BCD-93E2-E3B085C9AB24}">
+                  <p16:designElem xmlns:p16="http://schemas.microsoft.com/office/powerpoint/2015/main" val="1"/>
+                </p:ext>
+              </p:extLst>
+            </p:nvPr>
+          </p:nvGrpSpPr>
+          <p:grpSpPr>
+            <a:xfrm>
+              <a:off x="4135740" y="1795926"/>
+              <a:ext cx="558732" cy="575710"/>
+              <a:chOff x="1028007" y="1706560"/>
+              <a:chExt cx="575710" cy="575710"/>
+            </a:xfrm>
+          </p:grpSpPr>
+          <p:cxnSp>
+            <p:nvCxnSpPr>
+              <p:cNvPr id="10" name="Straight Connector 9">
+                <a:extLst>
+                  <a:ext uri="{FF2B5EF4-FFF2-40B4-BE49-F238E27FC236}">
+                    <a16:creationId xmlns:a16="http://schemas.microsoft.com/office/drawing/2014/main" id="{DE4A7237-B6EB-4FB7-8B68-7C27438D477D}"/>
+                  </a:ext>
+                  <a:ext uri="{C183D7F6-B498-43B3-948B-1728B52AA6E4}">
+                    <adec:decorative xmlns:adec="http://schemas.microsoft.com/office/drawing/2017/decorative" val="1"/>
+                  </a:ext>
+                </a:extLst>
+              </p:cNvPr>
+              <p:cNvCxnSpPr>
+                <a:cxnSpLocks/>
+              </p:cNvCxnSpPr>
+              <p:nvPr>
+                <p:extLst>
+                  <p:ext uri="{386F3935-93C4-4BCD-93E2-E3B085C9AB24}">
+                    <p16:designElem xmlns:p16="http://schemas.microsoft.com/office/powerpoint/2015/main" val="1"/>
+                  </p:ext>
+                </p:extLst>
+              </p:nvPr>
+            </p:nvCxnSpPr>
+            <p:spPr>
+              <a:xfrm>
+                <a:off x="1028007" y="1994415"/>
+                <a:ext cx="575710" cy="0"/>
+              </a:xfrm>
+              <a:prstGeom prst="line">
+                <a:avLst/>
+              </a:prstGeom>
+              <a:ln w="9525">
+                <a:solidFill>
+                  <a:schemeClr val="tx1"/>
+                </a:solidFill>
+              </a:ln>
+            </p:spPr>
+            <p:style>
+              <a:lnRef idx="1">
+                <a:schemeClr val="accent1"/>
+              </a:lnRef>
+              <a:fillRef idx="0">
+                <a:schemeClr val="accent1"/>
+              </a:fillRef>
+              <a:effectRef idx="0">
+                <a:schemeClr val="accent1"/>
+              </a:effectRef>
+              <a:fontRef idx="minor">
+                <a:schemeClr val="tx1"/>
+              </a:fontRef>
+            </p:style>
+          </p:cxnSp>
+          <p:cxnSp>
+            <p:nvCxnSpPr>
+              <p:cNvPr id="11" name="Straight Connector 10">
+                <a:extLst>
+                  <a:ext uri="{FF2B5EF4-FFF2-40B4-BE49-F238E27FC236}">
+                    <a16:creationId xmlns:a16="http://schemas.microsoft.com/office/drawing/2014/main" id="{84E00FDE-0838-4B5B-A782-6B6C92DB0A89}"/>
+                  </a:ext>
+                  <a:ext uri="{C183D7F6-B498-43B3-948B-1728B52AA6E4}">
+                    <adec:decorative xmlns:adec="http://schemas.microsoft.com/office/drawing/2017/decorative" val="1"/>
+                  </a:ext>
+                </a:extLst>
+              </p:cNvPr>
+              <p:cNvCxnSpPr>
+                <a:cxnSpLocks/>
+              </p:cNvCxnSpPr>
+              <p:nvPr>
+                <p:extLst>
+                  <p:ext uri="{386F3935-93C4-4BCD-93E2-E3B085C9AB24}">
+                    <p16:designElem xmlns:p16="http://schemas.microsoft.com/office/powerpoint/2015/main" val="1"/>
+                  </p:ext>
+                </p:extLst>
+              </p:nvPr>
+            </p:nvCxnSpPr>
+            <p:spPr>
+              <a:xfrm rot="16200000">
+                <a:off x="1028007" y="1994415"/>
+                <a:ext cx="575710" cy="0"/>
+              </a:xfrm>
+              <a:prstGeom prst="line">
+                <a:avLst/>
+              </a:prstGeom>
+              <a:ln w="9525">
+                <a:solidFill>
+                  <a:schemeClr val="tx1"/>
+                </a:solidFill>
+              </a:ln>
+            </p:spPr>
+            <p:style>
+              <a:lnRef idx="1">
+                <a:schemeClr val="accent1"/>
+              </a:lnRef>
+              <a:fillRef idx="0">
+                <a:schemeClr val="accent1"/>
+              </a:fillRef>
+              <a:effectRef idx="0">
+                <a:schemeClr val="accent1"/>
+              </a:effectRef>
+              <a:fontRef idx="minor">
+                <a:schemeClr val="tx1"/>
+              </a:fontRef>
+            </p:style>
+          </p:cxnSp>
+        </p:grpSp>
+        <p:sp>
+          <p:nvSpPr>
+            <p:cNvPr id="9" name="Oval 8">
+              <a:extLst>
+                <a:ext uri="{FF2B5EF4-FFF2-40B4-BE49-F238E27FC236}">
+                  <a16:creationId xmlns:a16="http://schemas.microsoft.com/office/drawing/2014/main" id="{2BC1B2F3-8E83-4A70-B103-979C67EECED1}"/>
+                </a:ext>
+                <a:ext uri="{C183D7F6-B498-43B3-948B-1728B52AA6E4}">
+                  <adec:decorative xmlns:adec="http://schemas.microsoft.com/office/drawing/2017/decorative" val="1"/>
+                </a:ext>
+              </a:extLst>
+            </p:cNvPr>
+            <p:cNvSpPr/>
+            <p:nvPr>
+              <p:extLst>
+                <p:ext uri="{386F3935-93C4-4BCD-93E2-E3B085C9AB24}">
+                  <p16:designElem xmlns:p16="http://schemas.microsoft.com/office/powerpoint/2015/main" val="1"/>
+                </p:ext>
+              </p:extLst>
+            </p:nvPr>
+          </p:nvSpPr>
+          <p:spPr>
+            <a:xfrm>
+              <a:off x="4336389" y="1946248"/>
+              <a:ext cx="157434" cy="157434"/>
+            </a:xfrm>
+            <a:prstGeom prst="ellipse">
+              <a:avLst/>
+            </a:prstGeom>
+            <a:noFill/>
+            <a:ln w="9525">
+              <a:solidFill>
+                <a:schemeClr val="tx1"/>
+              </a:solidFill>
+            </a:ln>
+          </p:spPr>
+          <p:style>
+            <a:lnRef idx="2">
+              <a:schemeClr val="accent1">
+                <a:shade val="50000"/>
+              </a:schemeClr>
+            </a:lnRef>
+            <a:fillRef idx="1">
+              <a:schemeClr val="accent1"/>
+            </a:fillRef>
+            <a:effectRef idx="0">
+              <a:schemeClr val="accent1"/>
+            </a:effectRef>
+            <a:fontRef idx="minor">
+              <a:schemeClr val="lt1"/>
+            </a:fontRef>
+          </p:style>
+          <p:txBody>
+            <a:bodyPr rtlCol="0" anchor="ctr"/>
+            <a:lstStyle/>
+            <a:p>
+              <a:pPr algn="ctr"/>
+              <a:endParaRPr lang="en-US"/>
+            </a:p>
+          </p:txBody>
+        </p:sp>
+      </p:grpSp>
+      <p:sp useBgFill="1">
+        <p:nvSpPr>
+          <p:cNvPr id="13" name="Rectangle 12">
+            <a:extLst>
+              <a:ext uri="{FF2B5EF4-FFF2-40B4-BE49-F238E27FC236}">
+                <a16:creationId xmlns:a16="http://schemas.microsoft.com/office/drawing/2014/main" id="{44380B69-D111-4EC8-B5F3-0369D510DD5E}"/>
+              </a:ext>
+              <a:ext uri="{C183D7F6-B498-43B3-948B-1728B52AA6E4}">
+                <adec:decorative xmlns:adec="http://schemas.microsoft.com/office/drawing/2017/decorative" val="1"/>
+              </a:ext>
+            </a:extLst>
+          </p:cNvPr>
+          <p:cNvSpPr>
+            <a:spLocks noGrp="1" noRot="1" noChangeAspect="1" noMove="1" noResize="1" noEditPoints="1" noAdjustHandles="1" noChangeArrowheads="1" noChangeShapeType="1" noTextEdit="1"/>
+          </p:cNvSpPr>
+          <p:nvPr>
+            <p:extLst>
+              <p:ext uri="{386F3935-93C4-4BCD-93E2-E3B085C9AB24}">
+                <p16:designElem xmlns:p16="http://schemas.microsoft.com/office/powerpoint/2015/main" val="1"/>
+              </p:ext>
+            </p:extLst>
+          </p:nvPr>
+        </p:nvSpPr>
+        <p:spPr>
+          <a:xfrm>
+            <a:off x="0" y="0"/>
+            <a:ext cx="12192000" cy="6858000"/>
+          </a:xfrm>
+          <a:prstGeom prst="rect">
+            <a:avLst/>
+          </a:prstGeom>
+          <a:ln w="12700" cap="flat" cmpd="sng" algn="ctr">
+            <a:noFill/>
+            <a:prstDash val="solid"/>
+            <a:miter lim="800000"/>
+          </a:ln>
+          <a:effectLst/>
+          <a:extLst>
+            <a:ext uri="{91240B29-F687-4F45-9708-019B960494DF}">
+              <a14:hiddenLine xmlns:a14="http://schemas.microsoft.com/office/drawing/2010/main" w="12700" cap="flat" cmpd="sng" algn="ctr">
+                <a:solidFill>
+                  <a:schemeClr val="accent1">
+                    <a:shade val="50000"/>
+                  </a:schemeClr>
+                </a:solidFill>
+                <a:prstDash val="solid"/>
+                <a:miter lim="800000"/>
+              </a14:hiddenLine>
+            </a:ext>
+          </a:extLst>
+        </p:spPr>
+        <p:style>
+          <a:lnRef idx="2">
+            <a:schemeClr val="accent1">
+              <a:shade val="50000"/>
+            </a:schemeClr>
+          </a:lnRef>
+          <a:fillRef idx="1">
+            <a:schemeClr val="accent1"/>
+          </a:fillRef>
+          <a:effectRef idx="0">
+            <a:schemeClr val="accent1"/>
+          </a:effectRef>
+          <a:fontRef idx="minor">
+            <a:schemeClr val="lt1"/>
+          </a:fontRef>
+        </p:style>
+        <p:txBody>
+          <a:bodyPr rtlCol="0" anchor="ctr"/>
+          <a:lstStyle/>
+          <a:p>
+            <a:pPr algn="ctr"/>
+            <a:endParaRPr lang="en-US"/>
+          </a:p>
+        </p:txBody>
+      </p:sp>
+      <p:sp>
+        <p:nvSpPr>
+          <p:cNvPr id="2" name="Titel 1">
+            <a:extLst>
+              <a:ext uri="{FF2B5EF4-FFF2-40B4-BE49-F238E27FC236}">
+                <a16:creationId xmlns:a16="http://schemas.microsoft.com/office/drawing/2014/main" id="{FEDF4118-3EAA-C6D0-B2DD-A8BF9C32AAD9}"/>
+              </a:ext>
+            </a:extLst>
+          </p:cNvPr>
+          <p:cNvSpPr>
+            <a:spLocks noGrp="1"/>
+          </p:cNvSpPr>
+          <p:nvPr>
+            <p:ph type="title"/>
+          </p:nvPr>
+        </p:nvSpPr>
+        <p:spPr>
+          <a:xfrm>
+            <a:off x="2039815" y="2984864"/>
+            <a:ext cx="9135460" cy="2863778"/>
+          </a:xfrm>
+        </p:spPr>
+        <p:txBody>
+          <a:bodyPr vert="horz" lIns="91440" tIns="45720" rIns="91440" bIns="45720" rtlCol="0" anchor="b">
+            <a:normAutofit/>
+          </a:bodyPr>
+          <a:lstStyle/>
+          <a:p>
+            <a:pPr algn="r">
+              <a:lnSpc>
+                <a:spcPct val="110000"/>
+              </a:lnSpc>
+            </a:pPr>
+            <a:r>
+              <a:rPr lang="en-US" sz="4100" i="1" kern="1200" dirty="0">
+                <a:solidFill>
+                  <a:srgbClr val="000000"/>
+                </a:solidFill>
+                <a:highlight>
+                  <a:srgbClr val="00FFFF"/>
+                </a:highlight>
+                <a:latin typeface="+mj-lt"/>
+                <a:ea typeface="+mj-ea"/>
+                <a:cs typeface="+mj-cs"/>
+              </a:rPr>
+              <a:t>Sehr </a:t>
+            </a:r>
+            <a:r>
+              <a:rPr lang="en-US" sz="4100" i="1" kern="1200" dirty="0" err="1">
+                <a:solidFill>
+                  <a:srgbClr val="000000"/>
+                </a:solidFill>
+                <a:highlight>
+                  <a:srgbClr val="00FFFF"/>
+                </a:highlight>
+                <a:latin typeface="+mj-lt"/>
+                <a:ea typeface="+mj-ea"/>
+                <a:cs typeface="+mj-cs"/>
+              </a:rPr>
+              <a:t>starke</a:t>
+            </a:r>
+            <a:r>
+              <a:rPr lang="en-US" sz="4100" i="1" kern="1200" dirty="0">
+                <a:solidFill>
+                  <a:srgbClr val="000000"/>
+                </a:solidFill>
+                <a:highlight>
+                  <a:srgbClr val="00FFFF"/>
+                </a:highlight>
+                <a:latin typeface="+mj-lt"/>
+                <a:ea typeface="+mj-ea"/>
+                <a:cs typeface="+mj-cs"/>
+              </a:rPr>
+              <a:t> </a:t>
+            </a:r>
+            <a:r>
+              <a:rPr lang="en-US" sz="4100" i="1" kern="1200" dirty="0" err="1">
+                <a:solidFill>
+                  <a:srgbClr val="000000"/>
+                </a:solidFill>
+                <a:highlight>
+                  <a:srgbClr val="00FFFF"/>
+                </a:highlight>
+                <a:latin typeface="+mj-lt"/>
+                <a:ea typeface="+mj-ea"/>
+                <a:cs typeface="+mj-cs"/>
+              </a:rPr>
+              <a:t>religiöse</a:t>
+            </a:r>
+            <a:r>
+              <a:rPr lang="en-US" sz="4100" i="1" kern="1200" dirty="0">
+                <a:solidFill>
+                  <a:srgbClr val="000000"/>
+                </a:solidFill>
+                <a:highlight>
+                  <a:srgbClr val="00FFFF"/>
+                </a:highlight>
+                <a:latin typeface="+mj-lt"/>
+                <a:ea typeface="+mj-ea"/>
+                <a:cs typeface="+mj-cs"/>
+              </a:rPr>
+              <a:t> </a:t>
+            </a:r>
+            <a:r>
+              <a:rPr lang="en-US" sz="4100" i="1" kern="1200" dirty="0" err="1">
+                <a:solidFill>
+                  <a:srgbClr val="000000"/>
+                </a:solidFill>
+                <a:highlight>
+                  <a:srgbClr val="00FFFF"/>
+                </a:highlight>
+                <a:latin typeface="+mj-lt"/>
+                <a:ea typeface="+mj-ea"/>
+                <a:cs typeface="+mj-cs"/>
+              </a:rPr>
+              <a:t>Überzeugungen</a:t>
+            </a:r>
+            <a:r>
+              <a:rPr lang="en-US" sz="4100" i="1" kern="1200" dirty="0">
+                <a:solidFill>
+                  <a:srgbClr val="000000"/>
+                </a:solidFill>
+                <a:highlight>
+                  <a:srgbClr val="00FFFF"/>
+                </a:highlight>
+                <a:latin typeface="+mj-lt"/>
+                <a:ea typeface="+mj-ea"/>
+                <a:cs typeface="+mj-cs"/>
+              </a:rPr>
+              <a:t>, die </a:t>
+            </a:r>
+            <a:r>
+              <a:rPr lang="en-US" sz="4100" i="1" kern="1200" dirty="0" err="1">
+                <a:solidFill>
+                  <a:srgbClr val="000000"/>
+                </a:solidFill>
+                <a:highlight>
+                  <a:srgbClr val="00FFFF"/>
+                </a:highlight>
+                <a:latin typeface="+mj-lt"/>
+                <a:ea typeface="+mj-ea"/>
+                <a:cs typeface="+mj-cs"/>
+              </a:rPr>
+              <a:t>zu</a:t>
+            </a:r>
+            <a:r>
+              <a:rPr lang="en-US" sz="4100" i="1" kern="1200" dirty="0">
+                <a:solidFill>
+                  <a:srgbClr val="000000"/>
+                </a:solidFill>
+                <a:highlight>
+                  <a:srgbClr val="00FFFF"/>
+                </a:highlight>
+                <a:latin typeface="+mj-lt"/>
+                <a:ea typeface="+mj-ea"/>
+                <a:cs typeface="+mj-cs"/>
+              </a:rPr>
+              <a:t> </a:t>
+            </a:r>
+            <a:r>
+              <a:rPr lang="en-US" sz="4100" i="1" kern="1200" dirty="0" err="1">
+                <a:solidFill>
+                  <a:srgbClr val="000000"/>
+                </a:solidFill>
+                <a:highlight>
+                  <a:srgbClr val="00FFFF"/>
+                </a:highlight>
+                <a:latin typeface="+mj-lt"/>
+                <a:ea typeface="+mj-ea"/>
+                <a:cs typeface="+mj-cs"/>
+              </a:rPr>
+              <a:t>Gewalt</a:t>
+            </a:r>
+            <a:r>
+              <a:rPr lang="en-US" sz="4100" i="1" kern="1200" dirty="0">
+                <a:solidFill>
+                  <a:srgbClr val="000000"/>
+                </a:solidFill>
+                <a:highlight>
+                  <a:srgbClr val="00FFFF"/>
+                </a:highlight>
+                <a:latin typeface="+mj-lt"/>
+                <a:ea typeface="+mj-ea"/>
+                <a:cs typeface="+mj-cs"/>
+              </a:rPr>
+              <a:t> </a:t>
+            </a:r>
+            <a:r>
+              <a:rPr lang="en-US" sz="4100" i="1" kern="1200" dirty="0" err="1">
+                <a:solidFill>
+                  <a:srgbClr val="000000"/>
+                </a:solidFill>
+                <a:highlight>
+                  <a:srgbClr val="00FFFF"/>
+                </a:highlight>
+                <a:latin typeface="+mj-lt"/>
+                <a:ea typeface="+mj-ea"/>
+                <a:cs typeface="+mj-cs"/>
+              </a:rPr>
+              <a:t>oder</a:t>
+            </a:r>
+            <a:r>
+              <a:rPr lang="en-US" sz="4100" i="1" kern="1200" dirty="0">
+                <a:solidFill>
+                  <a:srgbClr val="000000"/>
+                </a:solidFill>
+                <a:highlight>
+                  <a:srgbClr val="00FFFF"/>
+                </a:highlight>
+                <a:latin typeface="+mj-lt"/>
+                <a:ea typeface="+mj-ea"/>
+                <a:cs typeface="+mj-cs"/>
+              </a:rPr>
+              <a:t> </a:t>
+            </a:r>
+            <a:r>
+              <a:rPr lang="en-US" sz="4100" i="1" kern="1200" dirty="0" err="1">
+                <a:solidFill>
+                  <a:srgbClr val="000000"/>
+                </a:solidFill>
+                <a:highlight>
+                  <a:srgbClr val="00FFFF"/>
+                </a:highlight>
+                <a:latin typeface="+mj-lt"/>
+                <a:ea typeface="+mj-ea"/>
+                <a:cs typeface="+mj-cs"/>
+              </a:rPr>
+              <a:t>Intoleranz</a:t>
+            </a:r>
+            <a:r>
+              <a:rPr lang="en-US" sz="4100" i="1" kern="1200" dirty="0">
+                <a:solidFill>
+                  <a:srgbClr val="000000"/>
+                </a:solidFill>
+                <a:highlight>
+                  <a:srgbClr val="00FFFF"/>
+                </a:highlight>
+                <a:latin typeface="+mj-lt"/>
+                <a:ea typeface="+mj-ea"/>
+                <a:cs typeface="+mj-cs"/>
+              </a:rPr>
+              <a:t> </a:t>
+            </a:r>
+            <a:r>
+              <a:rPr lang="en-US" sz="4100" i="1" kern="1200" dirty="0" err="1">
+                <a:solidFill>
+                  <a:srgbClr val="000000"/>
+                </a:solidFill>
+                <a:highlight>
+                  <a:srgbClr val="00FFFF"/>
+                </a:highlight>
+                <a:latin typeface="+mj-lt"/>
+                <a:ea typeface="+mj-ea"/>
+                <a:cs typeface="+mj-cs"/>
+              </a:rPr>
+              <a:t>gegenüber</a:t>
+            </a:r>
+            <a:r>
+              <a:rPr lang="en-US" sz="4100" i="1" kern="1200" dirty="0">
+                <a:solidFill>
+                  <a:srgbClr val="000000"/>
+                </a:solidFill>
+                <a:highlight>
+                  <a:srgbClr val="00FFFF"/>
+                </a:highlight>
+                <a:latin typeface="+mj-lt"/>
+                <a:ea typeface="+mj-ea"/>
+                <a:cs typeface="+mj-cs"/>
+              </a:rPr>
+              <a:t> </a:t>
+            </a:r>
+            <a:r>
+              <a:rPr lang="en-US" sz="4100" i="1" kern="1200" dirty="0" err="1">
+                <a:solidFill>
+                  <a:srgbClr val="000000"/>
+                </a:solidFill>
+                <a:highlight>
+                  <a:srgbClr val="00FFFF"/>
+                </a:highlight>
+                <a:latin typeface="+mj-lt"/>
+                <a:ea typeface="+mj-ea"/>
+                <a:cs typeface="+mj-cs"/>
+              </a:rPr>
+              <a:t>anderen</a:t>
+            </a:r>
+            <a:r>
+              <a:rPr lang="en-US" sz="4100" i="1" kern="1200" dirty="0">
+                <a:solidFill>
+                  <a:srgbClr val="000000"/>
+                </a:solidFill>
+                <a:highlight>
+                  <a:srgbClr val="00FFFF"/>
+                </a:highlight>
+                <a:latin typeface="+mj-lt"/>
+                <a:ea typeface="+mj-ea"/>
+                <a:cs typeface="+mj-cs"/>
+              </a:rPr>
+              <a:t> </a:t>
+            </a:r>
+            <a:r>
+              <a:rPr lang="en-US" sz="4100" i="1" kern="1200" dirty="0" err="1">
+                <a:solidFill>
+                  <a:srgbClr val="000000"/>
+                </a:solidFill>
+                <a:highlight>
+                  <a:srgbClr val="00FFFF"/>
+                </a:highlight>
+                <a:latin typeface="+mj-lt"/>
+                <a:ea typeface="+mj-ea"/>
+                <a:cs typeface="+mj-cs"/>
+              </a:rPr>
+              <a:t>führen</a:t>
+            </a:r>
+            <a:endParaRPr lang="en-US" sz="4100" i="1" kern="1200" dirty="0">
+              <a:solidFill>
+                <a:srgbClr val="000000"/>
+              </a:solidFill>
+              <a:highlight>
+                <a:srgbClr val="00FFFF"/>
+              </a:highlight>
+              <a:latin typeface="+mj-lt"/>
+              <a:ea typeface="+mj-ea"/>
+              <a:cs typeface="+mj-cs"/>
+            </a:endParaRPr>
+          </a:p>
+        </p:txBody>
+      </p:sp>
+      <p:grpSp>
+        <p:nvGrpSpPr>
+          <p:cNvPr id="15" name="Group 14">
+            <a:extLst>
+              <a:ext uri="{FF2B5EF4-FFF2-40B4-BE49-F238E27FC236}">
+                <a16:creationId xmlns:a16="http://schemas.microsoft.com/office/drawing/2014/main" id="{3C3246EF-914B-46DC-9206-E9720D45E10E}"/>
+              </a:ext>
+              <a:ext uri="{C183D7F6-B498-43B3-948B-1728B52AA6E4}">
+                <adec:decorative xmlns:adec="http://schemas.microsoft.com/office/drawing/2017/decorative" val="1"/>
+              </a:ext>
+            </a:extLst>
+          </p:cNvPr>
+          <p:cNvGrpSpPr>
+            <a:grpSpLocks noGrp="1" noUngrp="1" noRot="1" noChangeAspect="1" noMove="1" noResize="1"/>
+          </p:cNvGrpSpPr>
+          <p:nvPr>
+            <p:extLst>
+              <p:ext uri="{386F3935-93C4-4BCD-93E2-E3B085C9AB24}">
+                <p16:designElem xmlns:p16="http://schemas.microsoft.com/office/powerpoint/2015/main" val="1"/>
+              </p:ext>
+            </p:extLst>
+          </p:nvPr>
+        </p:nvGrpSpPr>
+        <p:grpSpPr>
+          <a:xfrm>
+            <a:off x="174436" y="6388259"/>
+            <a:ext cx="358083" cy="368964"/>
+            <a:chOff x="4135740" y="1795926"/>
+            <a:chExt cx="558732" cy="575710"/>
+          </a:xfrm>
+        </p:grpSpPr>
+        <p:grpSp>
+          <p:nvGrpSpPr>
+            <p:cNvPr id="16" name="Group 15">
+              <a:extLst>
+                <a:ext uri="{FF2B5EF4-FFF2-40B4-BE49-F238E27FC236}">
+                  <a16:creationId xmlns:a16="http://schemas.microsoft.com/office/drawing/2014/main" id="{4BA1822C-C241-4161-9129-9526E5B64F4C}"/>
+                </a:ext>
+                <a:ext uri="{C183D7F6-B498-43B3-948B-1728B52AA6E4}">
+                  <adec:decorative xmlns:adec="http://schemas.microsoft.com/office/drawing/2017/decorative" val="1"/>
+                </a:ext>
+              </a:extLst>
+            </p:cNvPr>
+            <p:cNvGrpSpPr/>
+            <p:nvPr>
+              <p:extLst>
+                <p:ext uri="{386F3935-93C4-4BCD-93E2-E3B085C9AB24}">
+                  <p16:designElem xmlns:p16="http://schemas.microsoft.com/office/powerpoint/2015/main" val="1"/>
+                </p:ext>
+              </p:extLst>
+            </p:nvPr>
+          </p:nvGrpSpPr>
+          <p:grpSpPr>
+            <a:xfrm>
+              <a:off x="4135740" y="1795926"/>
+              <a:ext cx="558732" cy="575710"/>
+              <a:chOff x="1028007" y="1706560"/>
+              <a:chExt cx="575710" cy="575710"/>
+            </a:xfrm>
+          </p:grpSpPr>
+          <p:cxnSp>
+            <p:nvCxnSpPr>
+              <p:cNvPr id="18" name="Straight Connector 17">
+                <a:extLst>
+                  <a:ext uri="{FF2B5EF4-FFF2-40B4-BE49-F238E27FC236}">
+                    <a16:creationId xmlns:a16="http://schemas.microsoft.com/office/drawing/2014/main" id="{5D576056-C948-438D-9385-AA0786D4FD21}"/>
+                  </a:ext>
+                  <a:ext uri="{C183D7F6-B498-43B3-948B-1728B52AA6E4}">
+                    <adec:decorative xmlns:adec="http://schemas.microsoft.com/office/drawing/2017/decorative" val="1"/>
+                  </a:ext>
+                </a:extLst>
+              </p:cNvPr>
+              <p:cNvCxnSpPr>
+                <a:cxnSpLocks/>
+              </p:cNvCxnSpPr>
+              <p:nvPr>
+                <p:extLst>
+                  <p:ext uri="{386F3935-93C4-4BCD-93E2-E3B085C9AB24}">
+                    <p16:designElem xmlns:p16="http://schemas.microsoft.com/office/powerpoint/2015/main" val="1"/>
+                  </p:ext>
+                </p:extLst>
+              </p:nvPr>
+            </p:nvCxnSpPr>
+            <p:spPr>
+              <a:xfrm>
+                <a:off x="1028007" y="1994415"/>
+                <a:ext cx="575710" cy="0"/>
+              </a:xfrm>
+              <a:prstGeom prst="line">
+                <a:avLst/>
+              </a:prstGeom>
+              <a:ln w="9525">
+                <a:solidFill>
+                  <a:schemeClr val="tx1"/>
+                </a:solidFill>
+              </a:ln>
+            </p:spPr>
+            <p:style>
+              <a:lnRef idx="1">
+                <a:schemeClr val="accent1"/>
+              </a:lnRef>
+              <a:fillRef idx="0">
+                <a:schemeClr val="accent1"/>
+              </a:fillRef>
+              <a:effectRef idx="0">
+                <a:schemeClr val="accent1"/>
+              </a:effectRef>
+              <a:fontRef idx="minor">
+                <a:schemeClr val="tx1"/>
+              </a:fontRef>
+            </p:style>
+          </p:cxnSp>
+          <p:cxnSp>
+            <p:nvCxnSpPr>
+              <p:cNvPr id="19" name="Straight Connector 18">
+                <a:extLst>
+                  <a:ext uri="{FF2B5EF4-FFF2-40B4-BE49-F238E27FC236}">
+                    <a16:creationId xmlns:a16="http://schemas.microsoft.com/office/drawing/2014/main" id="{F56119DF-657B-4162-8F2E-EDD2AEDE53C0}"/>
+                  </a:ext>
+                  <a:ext uri="{C183D7F6-B498-43B3-948B-1728B52AA6E4}">
+                    <adec:decorative xmlns:adec="http://schemas.microsoft.com/office/drawing/2017/decorative" val="1"/>
+                  </a:ext>
+                </a:extLst>
+              </p:cNvPr>
+              <p:cNvCxnSpPr>
+                <a:cxnSpLocks/>
+              </p:cNvCxnSpPr>
+              <p:nvPr>
+                <p:extLst>
+                  <p:ext uri="{386F3935-93C4-4BCD-93E2-E3B085C9AB24}">
+                    <p16:designElem xmlns:p16="http://schemas.microsoft.com/office/powerpoint/2015/main" val="1"/>
+                  </p:ext>
+                </p:extLst>
+              </p:nvPr>
+            </p:nvCxnSpPr>
+            <p:spPr>
+              <a:xfrm rot="16200000">
+                <a:off x="1028007" y="1994415"/>
+                <a:ext cx="575710" cy="0"/>
+              </a:xfrm>
+              <a:prstGeom prst="line">
+                <a:avLst/>
+              </a:prstGeom>
+              <a:ln w="9525">
+                <a:solidFill>
+                  <a:schemeClr val="tx1"/>
+                </a:solidFill>
+              </a:ln>
+            </p:spPr>
+            <p:style>
+              <a:lnRef idx="1">
+                <a:schemeClr val="accent1"/>
+              </a:lnRef>
+              <a:fillRef idx="0">
+                <a:schemeClr val="accent1"/>
+              </a:fillRef>
+              <a:effectRef idx="0">
+                <a:schemeClr val="accent1"/>
+              </a:effectRef>
+              <a:fontRef idx="minor">
+                <a:schemeClr val="tx1"/>
+              </a:fontRef>
+            </p:style>
+          </p:cxnSp>
+        </p:grpSp>
+        <p:sp>
+          <p:nvSpPr>
+            <p:cNvPr id="17" name="Oval 16">
+              <a:extLst>
+                <a:ext uri="{FF2B5EF4-FFF2-40B4-BE49-F238E27FC236}">
+                  <a16:creationId xmlns:a16="http://schemas.microsoft.com/office/drawing/2014/main" id="{9C893FA9-72F5-4F87-ABF8-F3666826F50F}"/>
+                </a:ext>
+                <a:ext uri="{C183D7F6-B498-43B3-948B-1728B52AA6E4}">
+                  <adec:decorative xmlns:adec="http://schemas.microsoft.com/office/drawing/2017/decorative" val="1"/>
+                </a:ext>
+              </a:extLst>
+            </p:cNvPr>
+            <p:cNvSpPr/>
+            <p:nvPr>
+              <p:extLst>
+                <p:ext uri="{386F3935-93C4-4BCD-93E2-E3B085C9AB24}">
+                  <p16:designElem xmlns:p16="http://schemas.microsoft.com/office/powerpoint/2015/main" val="1"/>
+                </p:ext>
+              </p:extLst>
+            </p:nvPr>
+          </p:nvSpPr>
+          <p:spPr>
+            <a:xfrm>
+              <a:off x="4336389" y="1946248"/>
+              <a:ext cx="157434" cy="157434"/>
+            </a:xfrm>
+            <a:prstGeom prst="ellipse">
+              <a:avLst/>
+            </a:prstGeom>
+            <a:noFill/>
+            <a:ln w="9525">
+              <a:solidFill>
+                <a:schemeClr val="tx1"/>
+              </a:solidFill>
+            </a:ln>
+          </p:spPr>
+          <p:style>
+            <a:lnRef idx="2">
+              <a:schemeClr val="accent1">
+                <a:shade val="50000"/>
+              </a:schemeClr>
+            </a:lnRef>
+            <a:fillRef idx="1">
+              <a:schemeClr val="accent1"/>
+            </a:fillRef>
+            <a:effectRef idx="0">
+              <a:schemeClr val="accent1"/>
+            </a:effectRef>
+            <a:fontRef idx="minor">
+              <a:schemeClr val="lt1"/>
+            </a:fontRef>
+          </p:style>
+          <p:txBody>
+            <a:bodyPr rtlCol="0" anchor="ctr"/>
+            <a:lstStyle/>
+            <a:p>
+              <a:pPr algn="ctr"/>
+              <a:endParaRPr lang="en-US"/>
+            </a:p>
+          </p:txBody>
+        </p:sp>
+      </p:grpSp>
+    </p:spTree>
+    <p:extLst>
+      <p:ext uri="{BB962C8B-B14F-4D97-AF65-F5344CB8AC3E}">
+        <p14:creationId xmlns:p14="http://schemas.microsoft.com/office/powerpoint/2010/main" val="3618868438"/>
+      </p:ext>
+    </p:extLst>
+  </p:cSld>
+  <p:clrMapOvr>
+    <a:masterClrMapping/>
+  </p:clrMapOvr>
+</p:sld>
+</file>
+
+<file path=ppt/slides/slide4.xml><?xml version="1.0" encoding="utf-8"?>
+<p:sld xmlns:a="http://schemas.openxmlformats.org/drawingml/2006/main" xmlns:r="http://schemas.openxmlformats.org/officeDocument/2006/relationships" xmlns:p="http://schemas.openxmlformats.org/presentationml/2006/main">
+  <p:cSld>
+    <p:spTree>
+      <p:nvGrpSpPr>
+        <p:cNvPr id="1" name=""/>
+        <p:cNvGrpSpPr/>
+        <p:nvPr/>
+      </p:nvGrpSpPr>
+      <p:grpSpPr>
+        <a:xfrm>
+          <a:off x="0" y="0"/>
+          <a:ext cx="0" cy="0"/>
+          <a:chOff x="0" y="0"/>
+          <a:chExt cx="0" cy="0"/>
+        </a:xfrm>
+      </p:grpSpPr>
       <p:sp>
         <p:nvSpPr>
           <p:cNvPr id="2" name="Titel 1">
@@ -7765,13 +10367,13 @@
           <a:p>
             <a:r>
               <a:rPr lang="de-DE" sz="2000" dirty="0"/>
-              <a:t>„Sehr starke religiöse Überzeugung“</a:t>
+              <a:t>Sehr starke religiöse Überzeugung</a:t>
             </a:r>
           </a:p>
           <a:p>
             <a:r>
               <a:rPr lang="de-DE" sz="2000" dirty="0"/>
-              <a:t>Führt zu Gewalt, Intoleranz, …</a:t>
+              <a:t>Führt zu Gewalt und Intoleranz</a:t>
             </a:r>
           </a:p>
           <a:p>
@@ -7781,6 +10383,9 @@
             </a:r>
           </a:p>
           <a:p>
+            <a:pPr marL="0" indent="0">
+              <a:buNone/>
+            </a:pPr>
             <a:endParaRPr lang="de-DE" sz="1800" dirty="0"/>
           </a:p>
         </p:txBody>
@@ -7810,7 +10415,7 @@
 </p:sld>
 </file>
 
-<file path=ppt/slides/slide4.xml><?xml version="1.0" encoding="utf-8"?>
+<file path=ppt/slides/slide5.xml><?xml version="1.0" encoding="utf-8"?>
 <p:sld xmlns:a="http://schemas.openxmlformats.org/drawingml/2006/main" xmlns:r="http://schemas.openxmlformats.org/officeDocument/2006/relationships" xmlns:p="http://schemas.openxmlformats.org/presentationml/2006/main">
   <p:cSld>
     <p:spTree>
@@ -7953,7 +10558,7 @@
           <p:nvPr/>
         </p:nvPicPr>
         <p:blipFill rotWithShape="1">
-          <a:blip r:embed="rId2"/>
+          <a:blip r:embed="rId3"/>
           <a:srcRect l="39052" t="168" r="1516"/>
           <a:stretch/>
         </p:blipFill>
@@ -8034,7 +10639,7 @@
           <p:nvPr/>
         </p:nvPicPr>
         <p:blipFill>
-          <a:blip r:embed="rId3">
+          <a:blip r:embed="rId4">
             <a:extLst>
               <a:ext uri="{28A0092B-C50C-407E-A947-70E740481C1C}">
                 <a14:useLocalDpi xmlns:a14="http://schemas.microsoft.com/office/drawing/2010/main" val="0"/>
@@ -8079,7 +10684,7 @@
 </p:sld>
 </file>
 
-<file path=ppt/slides/slide5.xml><?xml version="1.0" encoding="utf-8"?>
+<file path=ppt/slides/slide6.xml><?xml version="1.0" encoding="utf-8"?>
 <p:sld xmlns:a="http://schemas.openxmlformats.org/drawingml/2006/main" xmlns:r="http://schemas.openxmlformats.org/officeDocument/2006/relationships" xmlns:p="http://schemas.openxmlformats.org/presentationml/2006/main">
   <p:cSld>
     <p:spTree>
@@ -8145,7 +10750,7 @@
           </p:nvPr>
         </p:nvPicPr>
         <p:blipFill rotWithShape="1">
-          <a:blip r:embed="rId2"/>
+          <a:blip r:embed="rId3"/>
           <a:srcRect l="39052" t="168" r="1516"/>
           <a:stretch/>
         </p:blipFill>
@@ -8245,7 +10850,7 @@
           <p:nvPr/>
         </p:nvPicPr>
         <p:blipFill>
-          <a:blip r:embed="rId3">
+          <a:blip r:embed="rId4">
             <a:extLst>
               <a:ext uri="{28A0092B-C50C-407E-A947-70E740481C1C}">
                 <a14:useLocalDpi xmlns:a14="http://schemas.microsoft.com/office/drawing/2010/main" val="0"/>
@@ -8290,7 +10895,7 @@
 </p:sld>
 </file>
 
-<file path=ppt/slides/slide6.xml><?xml version="1.0" encoding="utf-8"?>
+<file path=ppt/slides/slide7.xml><?xml version="1.0" encoding="utf-8"?>
 <p:sld xmlns:a="http://schemas.openxmlformats.org/drawingml/2006/main" xmlns:r="http://schemas.openxmlformats.org/officeDocument/2006/relationships" xmlns:p="http://schemas.openxmlformats.org/presentationml/2006/main">
   <p:cSld>
     <p:spTree>
@@ -8364,7 +10969,7 @@
           </p:nvPr>
         </p:nvPicPr>
         <p:blipFill>
-          <a:blip r:embed="rId2">
+          <a:blip r:embed="rId3">
             <a:extLst>
               <a:ext uri="{28A0092B-C50C-407E-A947-70E740481C1C}">
                 <a14:useLocalDpi xmlns:a14="http://schemas.microsoft.com/office/drawing/2010/main" val="0"/>
@@ -8468,7 +11073,7 @@
           <p:nvPr/>
         </p:nvPicPr>
         <p:blipFill rotWithShape="1">
-          <a:blip r:embed="rId3"/>
+          <a:blip r:embed="rId4"/>
           <a:srcRect l="39052" t="168" r="1516"/>
           <a:stretch/>
         </p:blipFill>
@@ -8507,141 +11112,6 @@
 </p:sld>
 </file>
 
-<file path=ppt/slides/slide7.xml><?xml version="1.0" encoding="utf-8"?>
-<p:sld xmlns:a="http://schemas.openxmlformats.org/drawingml/2006/main" xmlns:r="http://schemas.openxmlformats.org/officeDocument/2006/relationships" xmlns:p="http://schemas.openxmlformats.org/presentationml/2006/main">
-  <p:cSld>
-    <p:spTree>
-      <p:nvGrpSpPr>
-        <p:cNvPr id="1" name=""/>
-        <p:cNvGrpSpPr/>
-        <p:nvPr/>
-      </p:nvGrpSpPr>
-      <p:grpSpPr>
-        <a:xfrm>
-          <a:off x="0" y="0"/>
-          <a:ext cx="0" cy="0"/>
-          <a:chOff x="0" y="0"/>
-          <a:chExt cx="0" cy="0"/>
-        </a:xfrm>
-      </p:grpSpPr>
-      <p:sp>
-        <p:nvSpPr>
-          <p:cNvPr id="2" name="Titel 1">
-            <a:extLst>
-              <a:ext uri="{FF2B5EF4-FFF2-40B4-BE49-F238E27FC236}">
-                <a16:creationId xmlns:a16="http://schemas.microsoft.com/office/drawing/2014/main" id="{88DE2A4A-CB4D-1D9F-8B9A-6103EAC0C0F9}"/>
-              </a:ext>
-            </a:extLst>
-          </p:cNvPr>
-          <p:cNvSpPr>
-            <a:spLocks noGrp="1"/>
-          </p:cNvSpPr>
-          <p:nvPr>
-            <p:ph type="title"/>
-          </p:nvPr>
-        </p:nvSpPr>
-        <p:spPr/>
-        <p:txBody>
-          <a:bodyPr/>
-          <a:lstStyle/>
-          <a:p>
-            <a:r>
-              <a:rPr lang="de-DE" i="0" dirty="0">
-                <a:highlight>
-                  <a:srgbClr val="00FFFF"/>
-                </a:highlight>
-                <a:ea typeface="+mj-lt"/>
-                <a:cs typeface="+mj-lt"/>
-              </a:rPr>
-              <a:t>3. Was sind die Ursachen für religiösen Extremismus?</a:t>
-            </a:r>
-            <a:endParaRPr lang="de-DE" dirty="0">
-              <a:highlight>
-                <a:srgbClr val="00FFFF"/>
-              </a:highlight>
-            </a:endParaRPr>
-          </a:p>
-        </p:txBody>
-      </p:sp>
-      <p:sp>
-        <p:nvSpPr>
-          <p:cNvPr id="3" name="Inhaltsplatzhalter 2">
-            <a:extLst>
-              <a:ext uri="{FF2B5EF4-FFF2-40B4-BE49-F238E27FC236}">
-                <a16:creationId xmlns:a16="http://schemas.microsoft.com/office/drawing/2014/main" id="{054EFC14-0F57-CBC4-C9E9-F6272DFFD86E}"/>
-              </a:ext>
-            </a:extLst>
-          </p:cNvPr>
-          <p:cNvSpPr>
-            <a:spLocks noGrp="1"/>
-          </p:cNvSpPr>
-          <p:nvPr>
-            <p:ph idx="1"/>
-          </p:nvPr>
-        </p:nvSpPr>
-        <p:spPr/>
-        <p:txBody>
-          <a:bodyPr vert="horz" lIns="91440" tIns="45720" rIns="91440" bIns="45720" rtlCol="0" anchor="t">
-            <a:normAutofit/>
-          </a:bodyPr>
-          <a:lstStyle/>
-          <a:p>
-            <a:r>
-              <a:rPr lang="de-DE" sz="1800" dirty="0"/>
-              <a:t>Wunsch, seine Überzeugung zu schützen</a:t>
-            </a:r>
-          </a:p>
-          <a:p>
-            <a:r>
-              <a:rPr lang="de-DE" sz="1800" dirty="0"/>
-              <a:t>Das Bedürfnis einer Gemeinschaft angehören zu wollen</a:t>
-            </a:r>
-          </a:p>
-          <a:p>
-            <a:r>
-              <a:rPr lang="de-DE" sz="1800" dirty="0"/>
-              <a:t>Politische Faktoren</a:t>
-            </a:r>
-          </a:p>
-          <a:p>
-            <a:r>
-              <a:rPr lang="de-DE" sz="1800" dirty="0"/>
-              <a:t>Wirtschaftliche Faktoren</a:t>
-            </a:r>
-          </a:p>
-          <a:p>
-            <a:r>
-              <a:rPr lang="de-DE" sz="1800" dirty="0"/>
-              <a:t>Macht / Kontrolle erlangen</a:t>
-            </a:r>
-          </a:p>
-        </p:txBody>
-      </p:sp>
-    </p:spTree>
-    <p:extLst>
-      <p:ext uri="{BB962C8B-B14F-4D97-AF65-F5344CB8AC3E}">
-        <p14:creationId xmlns:p14="http://schemas.microsoft.com/office/powerpoint/2010/main" val="1093800141"/>
-      </p:ext>
-    </p:extLst>
-  </p:cSld>
-  <p:clrMapOvr>
-    <a:masterClrMapping/>
-  </p:clrMapOvr>
-  <mc:AlternateContent xmlns:mc="http://schemas.openxmlformats.org/markup-compatibility/2006" xmlns:p159="http://schemas.microsoft.com/office/powerpoint/2015/09/main">
-    <mc:Choice Requires="p159">
-      <p:transition xmlns:p14="http://schemas.microsoft.com/office/powerpoint/2010/main" spd="slow" p14:dur="2000">
-        <p159:morph option="byObject"/>
-      </p:transition>
-    </mc:Choice>
-    <mc:Fallback xmlns="">
-      <p:transition spd="slow">
-        <p:fade/>
-      </p:transition>
-    </mc:Fallback>
-  </mc:AlternateContent>
-</p:sld>
-</file>
-
 <file path=ppt/slides/slide8.xml><?xml version="1.0" encoding="utf-8"?>
 <p:sld xmlns:a="http://schemas.openxmlformats.org/drawingml/2006/main" xmlns:r="http://schemas.openxmlformats.org/officeDocument/2006/relationships" xmlns:p="http://schemas.openxmlformats.org/presentationml/2006/main">
   <p:cSld>
@@ -8688,7 +11158,7 @@
                 <a:ea typeface="+mj-lt"/>
                 <a:cs typeface="+mj-lt"/>
               </a:rPr>
-              <a:t>4. Welche Folgen hat religiöser Extremismus?</a:t>
+              <a:t>3. Was sind die Ursachen für religiösen Extremismus?</a:t>
             </a:r>
             <a:endParaRPr lang="de-DE" dirty="0">
               <a:highlight>
@@ -8722,47 +11192,32 @@
           <a:lstStyle/>
           <a:p>
             <a:r>
-              <a:rPr lang="de-DE" sz="1800" dirty="0">
-                <a:ea typeface="+mn-lt"/>
-                <a:cs typeface="+mn-lt"/>
-              </a:rPr>
-              <a:t>Soziale Disharmonie</a:t>
-            </a:r>
-          </a:p>
-          <a:p>
-            <a:r>
-              <a:rPr lang="de-DE" sz="1800" dirty="0">
-                <a:ea typeface="+mn-lt"/>
-                <a:cs typeface="+mn-lt"/>
-              </a:rPr>
-              <a:t>Konflikte / Gewalt</a:t>
-            </a:r>
-          </a:p>
-          <a:p>
-            <a:r>
-              <a:rPr lang="de-DE" sz="1800" dirty="0">
-                <a:ea typeface="+mn-lt"/>
-                <a:cs typeface="+mn-lt"/>
-              </a:rPr>
-              <a:t>Verlust Individueller Freiheiten</a:t>
-            </a:r>
-          </a:p>
-          <a:p>
-            <a:r>
-              <a:rPr lang="de-DE" sz="1800" dirty="0">
-                <a:ea typeface="+mn-lt"/>
-                <a:cs typeface="+mn-lt"/>
-              </a:rPr>
-              <a:t>Verschlechterung der Lebensqualität</a:t>
-            </a:r>
-          </a:p>
-          <a:p>
-            <a:r>
-              <a:rPr lang="de-DE" sz="1800" dirty="0">
-                <a:ea typeface="+mn-lt"/>
-                <a:cs typeface="+mn-lt"/>
-              </a:rPr>
-              <a:t>Völkermorde und Massenmorde</a:t>
+              <a:rPr lang="de-DE" sz="1800" dirty="0"/>
+              <a:t>Wunsch, seine Überzeugung zu schützen</a:t>
+            </a:r>
+          </a:p>
+          <a:p>
+            <a:r>
+              <a:rPr lang="de-DE" sz="1800" dirty="0"/>
+              <a:t>Das Bedürfnis einer Gemeinschaft angehören zu wollen</a:t>
+            </a:r>
+          </a:p>
+          <a:p>
+            <a:r>
+              <a:rPr lang="de-DE" sz="1800" dirty="0"/>
+              <a:t>Politische Faktoren</a:t>
+            </a:r>
+          </a:p>
+          <a:p>
+            <a:r>
+              <a:rPr lang="de-DE" sz="1800" dirty="0"/>
+              <a:t>Wirtschaftliche Faktoren</a:t>
+            </a:r>
+          </a:p>
+          <a:p>
+            <a:r>
+              <a:rPr lang="de-DE" sz="1800" dirty="0"/>
+              <a:t>Macht / Kontrolle erlangen</a:t>
             </a:r>
           </a:p>
         </p:txBody>
@@ -8770,7 +11225,7 @@
     </p:spTree>
     <p:extLst>
       <p:ext uri="{BB962C8B-B14F-4D97-AF65-F5344CB8AC3E}">
-        <p14:creationId xmlns:p14="http://schemas.microsoft.com/office/powerpoint/2010/main" val="2630299950"/>
+        <p14:creationId xmlns:p14="http://schemas.microsoft.com/office/powerpoint/2010/main" val="1093800141"/>
       </p:ext>
     </p:extLst>
   </p:cSld>
@@ -8838,7 +11293,7 @@
                 <a:ea typeface="+mj-lt"/>
                 <a:cs typeface="+mj-lt"/>
               </a:rPr>
-              <a:t>5. Wie kann religiöser Extremismus verhindert werden?</a:t>
+              <a:t>4. Welche Folgen hat religiöser Extremismus?</a:t>
             </a:r>
             <a:endParaRPr lang="de-DE" dirty="0">
               <a:highlight>
@@ -8872,177 +11327,55 @@
           <a:lstStyle/>
           <a:p>
             <a:r>
-              <a:rPr lang="de-DE" sz="2000" dirty="0"/>
-              <a:t>Bereitstellen von Bildungsangeboten</a:t>
-            </a:r>
-          </a:p>
-          <a:p>
-            <a:r>
-              <a:rPr lang="de-DE" sz="2000" dirty="0"/>
-              <a:t>Förderung des Dialogs und der Debatte zwischen religiösen Gruppen</a:t>
-            </a:r>
-          </a:p>
-          <a:p>
-            <a:r>
-              <a:rPr lang="de-DE" sz="2000" dirty="0"/>
-              <a:t>Förderung des Säkularismus</a:t>
-            </a:r>
-          </a:p>
-          <a:p>
-            <a:r>
-              <a:rPr lang="de-DE" sz="2000" dirty="0"/>
-              <a:t>Lösen von sozialer und wirtschaftlichen Missständen</a:t>
-            </a:r>
-          </a:p>
-          <a:p>
-            <a:r>
-              <a:rPr lang="de-DE" sz="2000" dirty="0"/>
-              <a:t>Finanzierung und Rekrutierung von Extremisten stoppen</a:t>
-            </a:r>
-          </a:p>
-        </p:txBody>
-      </p:sp>
-      <p:sp>
-        <p:nvSpPr>
-          <p:cNvPr id="4" name="Titel 1">
-            <a:extLst>
-              <a:ext uri="{FF2B5EF4-FFF2-40B4-BE49-F238E27FC236}">
-                <a16:creationId xmlns:a16="http://schemas.microsoft.com/office/drawing/2014/main" id="{608F759F-9B20-5C14-099E-E72EA758636D}"/>
-              </a:ext>
-            </a:extLst>
-          </p:cNvPr>
-          <p:cNvSpPr txBox="1">
-            <a:spLocks/>
-          </p:cNvSpPr>
-          <p:nvPr/>
-        </p:nvSpPr>
-        <p:spPr>
-          <a:xfrm>
-            <a:off x="3056540" y="6858000"/>
-            <a:ext cx="9135460" cy="2863778"/>
-          </a:xfrm>
-          <a:prstGeom prst="rect">
-            <a:avLst/>
-          </a:prstGeom>
-        </p:spPr>
-        <p:txBody>
-          <a:bodyPr vert="horz" lIns="91440" tIns="45720" rIns="91440" bIns="45720" rtlCol="0" anchor="b">
-            <a:normAutofit/>
-          </a:bodyPr>
-          <a:lstStyle>
-            <a:lvl1pPr algn="l" defTabSz="914400" rtl="0" eaLnBrk="1" latinLnBrk="0" hangingPunct="1">
-              <a:lnSpc>
-                <a:spcPct val="120000"/>
-              </a:lnSpc>
-              <a:spcBef>
-                <a:spcPct val="0"/>
-              </a:spcBef>
-              <a:buNone/>
-              <a:defRPr sz="4000" i="1" kern="1200">
-                <a:solidFill>
-                  <a:srgbClr val="000000"/>
-                </a:solidFill>
-                <a:highlight>
-                  <a:srgbClr val="FFFF00"/>
-                </a:highlight>
-                <a:latin typeface="+mj-lt"/>
-                <a:ea typeface="+mj-ea"/>
-                <a:cs typeface="+mj-cs"/>
-              </a:defRPr>
-            </a:lvl1pPr>
-          </a:lstStyle>
-          <a:p>
-            <a:pPr algn="r">
-              <a:spcAft>
-                <a:spcPts val="600"/>
-              </a:spcAft>
-            </a:pPr>
-            <a:r>
-              <a:rPr lang="en-US" sz="6600" i="1" kern="1200" dirty="0" err="1">
-                <a:solidFill>
-                  <a:srgbClr val="000000"/>
-                </a:solidFill>
-                <a:highlight>
-                  <a:srgbClr val="00FFFF"/>
-                </a:highlight>
-                <a:latin typeface="+mj-lt"/>
-                <a:ea typeface="+mj-ea"/>
-                <a:cs typeface="+mj-cs"/>
+              <a:rPr lang="de-DE" sz="1800" dirty="0">
+                <a:ea typeface="+mn-lt"/>
+                <a:cs typeface="+mn-lt"/>
               </a:rPr>
-              <a:t>Danke</a:t>
-            </a:r>
-            <a:r>
-              <a:rPr lang="en-US" sz="6600" i="1" kern="1200" dirty="0">
-                <a:solidFill>
-                  <a:srgbClr val="000000"/>
-                </a:solidFill>
-                <a:highlight>
-                  <a:srgbClr val="00FFFF"/>
-                </a:highlight>
-                <a:latin typeface="+mj-lt"/>
-                <a:ea typeface="+mj-ea"/>
-                <a:cs typeface="+mj-cs"/>
+              <a:t>Soziale Disharmonie</a:t>
+            </a:r>
+          </a:p>
+          <a:p>
+            <a:r>
+              <a:rPr lang="de-DE" sz="1800" dirty="0">
+                <a:ea typeface="+mn-lt"/>
+                <a:cs typeface="+mn-lt"/>
               </a:rPr>
-              <a:t> </a:t>
-            </a:r>
-            <a:r>
-              <a:rPr lang="en-US" sz="6600" i="1" kern="1200" dirty="0" err="1">
-                <a:solidFill>
-                  <a:srgbClr val="000000"/>
-                </a:solidFill>
-                <a:highlight>
-                  <a:srgbClr val="00FFFF"/>
-                </a:highlight>
-                <a:latin typeface="+mj-lt"/>
-                <a:ea typeface="+mj-ea"/>
-                <a:cs typeface="+mj-cs"/>
+              <a:t>Konflikte / Gewalt</a:t>
+            </a:r>
+          </a:p>
+          <a:p>
+            <a:r>
+              <a:rPr lang="de-DE" sz="1800" dirty="0">
+                <a:ea typeface="+mn-lt"/>
+                <a:cs typeface="+mn-lt"/>
               </a:rPr>
-              <a:t>fürs</a:t>
-            </a:r>
-            <a:r>
-              <a:rPr lang="en-US" sz="6600" i="1" kern="1200" dirty="0">
-                <a:solidFill>
-                  <a:srgbClr val="000000"/>
-                </a:solidFill>
-                <a:highlight>
-                  <a:srgbClr val="00FFFF"/>
-                </a:highlight>
-                <a:latin typeface="+mj-lt"/>
-                <a:ea typeface="+mj-ea"/>
-                <a:cs typeface="+mj-cs"/>
+              <a:t>Verlust Individueller Freiheiten</a:t>
+            </a:r>
+          </a:p>
+          <a:p>
+            <a:r>
+              <a:rPr lang="de-DE" sz="1800" dirty="0">
+                <a:ea typeface="+mn-lt"/>
+                <a:cs typeface="+mn-lt"/>
               </a:rPr>
-              <a:t> </a:t>
-            </a:r>
-            <a:r>
-              <a:rPr lang="en-US" sz="6600" i="1" kern="1200" dirty="0" err="1">
-                <a:solidFill>
-                  <a:srgbClr val="000000"/>
-                </a:solidFill>
-                <a:highlight>
-                  <a:srgbClr val="00FFFF"/>
-                </a:highlight>
-                <a:latin typeface="+mj-lt"/>
-                <a:ea typeface="+mj-ea"/>
-                <a:cs typeface="+mj-cs"/>
+              <a:t>Verschlechterung der Lebensqualität</a:t>
+            </a:r>
+          </a:p>
+          <a:p>
+            <a:r>
+              <a:rPr lang="de-DE" sz="1800" dirty="0">
+                <a:ea typeface="+mn-lt"/>
+                <a:cs typeface="+mn-lt"/>
               </a:rPr>
-              <a:t>Zuhören</a:t>
-            </a:r>
-            <a:endParaRPr lang="en-US" sz="6600" i="1" kern="1200" dirty="0">
-              <a:solidFill>
-                <a:srgbClr val="000000"/>
-              </a:solidFill>
-              <a:highlight>
-                <a:srgbClr val="00FFFF"/>
-              </a:highlight>
-              <a:latin typeface="+mj-lt"/>
-            </a:endParaRPr>
+              <a:t>Völkermorde und Massenmorde</a:t>
+            </a:r>
           </a:p>
         </p:txBody>
       </p:sp>
     </p:spTree>
     <p:extLst>
       <p:ext uri="{BB962C8B-B14F-4D97-AF65-F5344CB8AC3E}">
-        <p14:creationId xmlns:p14="http://schemas.microsoft.com/office/powerpoint/2010/main" val="627934862"/>
+        <p14:creationId xmlns:p14="http://schemas.microsoft.com/office/powerpoint/2010/main" val="2630299950"/>
       </p:ext>
     </p:extLst>
   </p:cSld>
@@ -9263,4 +11596,299 @@
     </a:ext>
   </a:extLst>
 </a:theme>
+</file>
+
+<file path=ppt/theme/theme2.xml><?xml version="1.0" encoding="utf-8"?>
+<a:theme xmlns:a="http://schemas.openxmlformats.org/drawingml/2006/main" name="Office">
+  <a:themeElements>
+    <a:clrScheme name="Office">
+      <a:dk1>
+        <a:sysClr val="windowText" lastClr="000000"/>
+      </a:dk1>
+      <a:lt1>
+        <a:sysClr val="window" lastClr="FFFFFF"/>
+      </a:lt1>
+      <a:dk2>
+        <a:srgbClr val="44546A"/>
+      </a:dk2>
+      <a:lt2>
+        <a:srgbClr val="E7E6E6"/>
+      </a:lt2>
+      <a:accent1>
+        <a:srgbClr val="4472C4"/>
+      </a:accent1>
+      <a:accent2>
+        <a:srgbClr val="ED7D31"/>
+      </a:accent2>
+      <a:accent3>
+        <a:srgbClr val="A5A5A5"/>
+      </a:accent3>
+      <a:accent4>
+        <a:srgbClr val="FFC000"/>
+      </a:accent4>
+      <a:accent5>
+        <a:srgbClr val="5B9BD5"/>
+      </a:accent5>
+      <a:accent6>
+        <a:srgbClr val="70AD47"/>
+      </a:accent6>
+      <a:hlink>
+        <a:srgbClr val="0563C1"/>
+      </a:hlink>
+      <a:folHlink>
+        <a:srgbClr val="954F72"/>
+      </a:folHlink>
+    </a:clrScheme>
+    <a:fontScheme name="Office">
+      <a:majorFont>
+        <a:latin typeface="Calibri Light" panose="020F0302020204030204"/>
+        <a:ea typeface=""/>
+        <a:cs typeface=""/>
+        <a:font script="Jpan" typeface="游ゴシック Light"/>
+        <a:font script="Hang" typeface="맑은 고딕"/>
+        <a:font script="Hans" typeface="等线 Light"/>
+        <a:font script="Hant" typeface="新細明體"/>
+        <a:font script="Arab" typeface="Times New Roman"/>
+        <a:font script="Hebr" typeface="Times New Roman"/>
+        <a:font script="Thai" typeface="Angsana New"/>
+        <a:font script="Ethi" typeface="Nyala"/>
+        <a:font script="Beng" typeface="Vrinda"/>
+        <a:font script="Gujr" typeface="Shruti"/>
+        <a:font script="Khmr" typeface="MoolBoran"/>
+        <a:font script="Knda" typeface="Tunga"/>
+        <a:font script="Guru" typeface="Raavi"/>
+        <a:font script="Cans" typeface="Euphemia"/>
+        <a:font script="Cher" typeface="Plantagenet Cherokee"/>
+        <a:font script="Yiii" typeface="Microsoft Yi Baiti"/>
+        <a:font script="Tibt" typeface="Microsoft Himalaya"/>
+        <a:font script="Thaa" typeface="MV Boli"/>
+        <a:font script="Deva" typeface="Mangal"/>
+        <a:font script="Telu" typeface="Gautami"/>
+        <a:font script="Taml" typeface="Latha"/>
+        <a:font script="Syrc" typeface="Estrangelo Edessa"/>
+        <a:font script="Orya" typeface="Kalinga"/>
+        <a:font script="Mlym" typeface="Kartika"/>
+        <a:font script="Laoo" typeface="DokChampa"/>
+        <a:font script="Sinh" typeface="Iskoola Pota"/>
+        <a:font script="Mong" typeface="Mongolian Baiti"/>
+        <a:font script="Viet" typeface="Times New Roman"/>
+        <a:font script="Uigh" typeface="Microsoft Uighur"/>
+        <a:font script="Geor" typeface="Sylfaen"/>
+        <a:font script="Armn" typeface="Arial"/>
+        <a:font script="Bugi" typeface="Leelawadee UI"/>
+        <a:font script="Bopo" typeface="Microsoft JhengHei"/>
+        <a:font script="Java" typeface="Javanese Text"/>
+        <a:font script="Lisu" typeface="Segoe UI"/>
+        <a:font script="Mymr" typeface="Myanmar Text"/>
+        <a:font script="Nkoo" typeface="Ebrima"/>
+        <a:font script="Olck" typeface="Nirmala UI"/>
+        <a:font script="Osma" typeface="Ebrima"/>
+        <a:font script="Phag" typeface="Phagspa"/>
+        <a:font script="Syrn" typeface="Estrangelo Edessa"/>
+        <a:font script="Syrj" typeface="Estrangelo Edessa"/>
+        <a:font script="Syre" typeface="Estrangelo Edessa"/>
+        <a:font script="Sora" typeface="Nirmala UI"/>
+        <a:font script="Tale" typeface="Microsoft Tai Le"/>
+        <a:font script="Talu" typeface="Microsoft New Tai Lue"/>
+        <a:font script="Tfng" typeface="Ebrima"/>
+      </a:majorFont>
+      <a:minorFont>
+        <a:latin typeface="Calibri" panose="020F0502020204030204"/>
+        <a:ea typeface=""/>
+        <a:cs typeface=""/>
+        <a:font script="Jpan" typeface="游ゴシック"/>
+        <a:font script="Hang" typeface="맑은 고딕"/>
+        <a:font script="Hans" typeface="等线"/>
+        <a:font script="Hant" typeface="新細明體"/>
+        <a:font script="Arab" typeface="Arial"/>
+        <a:font script="Hebr" typeface="Arial"/>
+        <a:font script="Thai" typeface="Cordia New"/>
+        <a:font script="Ethi" typeface="Nyala"/>
+        <a:font script="Beng" typeface="Vrinda"/>
+        <a:font script="Gujr" typeface="Shruti"/>
+        <a:font script="Khmr" typeface="DaunPenh"/>
+        <a:font script="Knda" typeface="Tunga"/>
+        <a:font script="Guru" typeface="Raavi"/>
+        <a:font script="Cans" typeface="Euphemia"/>
+        <a:font script="Cher" typeface="Plantagenet Cherokee"/>
+        <a:font script="Yiii" typeface="Microsoft Yi Baiti"/>
+        <a:font script="Tibt" typeface="Microsoft Himalaya"/>
+        <a:font script="Thaa" typeface="MV Boli"/>
+        <a:font script="Deva" typeface="Mangal"/>
+        <a:font script="Telu" typeface="Gautami"/>
+        <a:font script="Taml" typeface="Latha"/>
+        <a:font script="Syrc" typeface="Estrangelo Edessa"/>
+        <a:font script="Orya" typeface="Kalinga"/>
+        <a:font script="Mlym" typeface="Kartika"/>
+        <a:font script="Laoo" typeface="DokChampa"/>
+        <a:font script="Sinh" typeface="Iskoola Pota"/>
+        <a:font script="Mong" typeface="Mongolian Baiti"/>
+        <a:font script="Viet" typeface="Arial"/>
+        <a:font script="Uigh" typeface="Microsoft Uighur"/>
+        <a:font script="Geor" typeface="Sylfaen"/>
+        <a:font script="Armn" typeface="Arial"/>
+        <a:font script="Bugi" typeface="Leelawadee UI"/>
+        <a:font script="Bopo" typeface="Microsoft JhengHei"/>
+        <a:font script="Java" typeface="Javanese Text"/>
+        <a:font script="Lisu" typeface="Segoe UI"/>
+        <a:font script="Mymr" typeface="Myanmar Text"/>
+        <a:font script="Nkoo" typeface="Ebrima"/>
+        <a:font script="Olck" typeface="Nirmala UI"/>
+        <a:font script="Osma" typeface="Ebrima"/>
+        <a:font script="Phag" typeface="Phagspa"/>
+        <a:font script="Syrn" typeface="Estrangelo Edessa"/>
+        <a:font script="Syrj" typeface="Estrangelo Edessa"/>
+        <a:font script="Syre" typeface="Estrangelo Edessa"/>
+        <a:font script="Sora" typeface="Nirmala UI"/>
+        <a:font script="Tale" typeface="Microsoft Tai Le"/>
+        <a:font script="Talu" typeface="Microsoft New Tai Lue"/>
+        <a:font script="Tfng" typeface="Ebrima"/>
+      </a:minorFont>
+    </a:fontScheme>
+    <a:fmtScheme name="Office">
+      <a:fillStyleLst>
+        <a:solidFill>
+          <a:schemeClr val="phClr"/>
+        </a:solidFill>
+        <a:gradFill rotWithShape="1">
+          <a:gsLst>
+            <a:gs pos="0">
+              <a:schemeClr val="phClr">
+                <a:lumMod val="110000"/>
+                <a:satMod val="105000"/>
+                <a:tint val="67000"/>
+              </a:schemeClr>
+            </a:gs>
+            <a:gs pos="50000">
+              <a:schemeClr val="phClr">
+                <a:lumMod val="105000"/>
+                <a:satMod val="103000"/>
+                <a:tint val="73000"/>
+              </a:schemeClr>
+            </a:gs>
+            <a:gs pos="100000">
+              <a:schemeClr val="phClr">
+                <a:lumMod val="105000"/>
+                <a:satMod val="109000"/>
+                <a:tint val="81000"/>
+              </a:schemeClr>
+            </a:gs>
+          </a:gsLst>
+          <a:lin ang="5400000" scaled="0"/>
+        </a:gradFill>
+        <a:gradFill rotWithShape="1">
+          <a:gsLst>
+            <a:gs pos="0">
+              <a:schemeClr val="phClr">
+                <a:satMod val="103000"/>
+                <a:lumMod val="102000"/>
+                <a:tint val="94000"/>
+              </a:schemeClr>
+            </a:gs>
+            <a:gs pos="50000">
+              <a:schemeClr val="phClr">
+                <a:satMod val="110000"/>
+                <a:lumMod val="100000"/>
+                <a:shade val="100000"/>
+              </a:schemeClr>
+            </a:gs>
+            <a:gs pos="100000">
+              <a:schemeClr val="phClr">
+                <a:lumMod val="99000"/>
+                <a:satMod val="120000"/>
+                <a:shade val="78000"/>
+              </a:schemeClr>
+            </a:gs>
+          </a:gsLst>
+          <a:lin ang="5400000" scaled="0"/>
+        </a:gradFill>
+      </a:fillStyleLst>
+      <a:lnStyleLst>
+        <a:ln w="6350" cap="flat" cmpd="sng" algn="ctr">
+          <a:solidFill>
+            <a:schemeClr val="phClr"/>
+          </a:solidFill>
+          <a:prstDash val="solid"/>
+          <a:miter lim="800000"/>
+        </a:ln>
+        <a:ln w="12700" cap="flat" cmpd="sng" algn="ctr">
+          <a:solidFill>
+            <a:schemeClr val="phClr"/>
+          </a:solidFill>
+          <a:prstDash val="solid"/>
+          <a:miter lim="800000"/>
+        </a:ln>
+        <a:ln w="19050" cap="flat" cmpd="sng" algn="ctr">
+          <a:solidFill>
+            <a:schemeClr val="phClr"/>
+          </a:solidFill>
+          <a:prstDash val="solid"/>
+          <a:miter lim="800000"/>
+        </a:ln>
+      </a:lnStyleLst>
+      <a:effectStyleLst>
+        <a:effectStyle>
+          <a:effectLst/>
+        </a:effectStyle>
+        <a:effectStyle>
+          <a:effectLst/>
+        </a:effectStyle>
+        <a:effectStyle>
+          <a:effectLst>
+            <a:outerShdw blurRad="57150" dist="19050" dir="5400000" algn="ctr" rotWithShape="0">
+              <a:srgbClr val="000000">
+                <a:alpha val="63000"/>
+              </a:srgbClr>
+            </a:outerShdw>
+          </a:effectLst>
+        </a:effectStyle>
+      </a:effectStyleLst>
+      <a:bgFillStyleLst>
+        <a:solidFill>
+          <a:schemeClr val="phClr"/>
+        </a:solidFill>
+        <a:solidFill>
+          <a:schemeClr val="phClr">
+            <a:tint val="95000"/>
+            <a:satMod val="170000"/>
+          </a:schemeClr>
+        </a:solidFill>
+        <a:gradFill rotWithShape="1">
+          <a:gsLst>
+            <a:gs pos="0">
+              <a:schemeClr val="phClr">
+                <a:tint val="93000"/>
+                <a:satMod val="150000"/>
+                <a:shade val="98000"/>
+                <a:lumMod val="102000"/>
+              </a:schemeClr>
+            </a:gs>
+            <a:gs pos="50000">
+              <a:schemeClr val="phClr">
+                <a:tint val="98000"/>
+                <a:satMod val="130000"/>
+                <a:shade val="90000"/>
+                <a:lumMod val="103000"/>
+              </a:schemeClr>
+            </a:gs>
+            <a:gs pos="100000">
+              <a:schemeClr val="phClr">
+                <a:shade val="63000"/>
+                <a:satMod val="120000"/>
+              </a:schemeClr>
+            </a:gs>
+          </a:gsLst>
+          <a:lin ang="5400000" scaled="0"/>
+        </a:gradFill>
+      </a:bgFillStyleLst>
+    </a:fmtScheme>
+  </a:themeElements>
+  <a:objectDefaults/>
+  <a:extraClrSchemeLst/>
+  <a:extLst>
+    <a:ext uri="{05A4C25C-085E-4340-85A3-A5531E510DB2}">
+      <thm15:themeFamily xmlns:thm15="http://schemas.microsoft.com/office/thememl/2012/main" name="Office Theme" id="{62F939B6-93AF-4DB8-9C6B-D6C7DFDC589F}" vid="{4A3C46E8-61CC-4603-A589-7422A47A8E4A}"/>
+    </a:ext>
+  </a:extLst>
+</a:theme>
 </file>
</xml_diff>